<commit_message>
add a new presentation
</commit_message>
<xml_diff>
--- a/Gesture Control System.pptx
+++ b/Gesture Control System.pptx
@@ -5,7 +5,7 @@
     <p:sldMasterId id="2147483811" r:id="rId1"/>
   </p:sldMasterIdLst>
   <p:notesMasterIdLst>
-    <p:notesMasterId r:id="rId15"/>
+    <p:notesMasterId r:id="rId18"/>
   </p:notesMasterIdLst>
   <p:sldIdLst>
     <p:sldId id="298" r:id="rId2"/>
@@ -13,14 +13,17 @@
     <p:sldId id="300" r:id="rId4"/>
     <p:sldId id="301" r:id="rId5"/>
     <p:sldId id="302" r:id="rId6"/>
-    <p:sldId id="338" r:id="rId7"/>
-    <p:sldId id="339" r:id="rId8"/>
-    <p:sldId id="340" r:id="rId9"/>
-    <p:sldId id="341" r:id="rId10"/>
-    <p:sldId id="342" r:id="rId11"/>
-    <p:sldId id="343" r:id="rId12"/>
-    <p:sldId id="344" r:id="rId13"/>
-    <p:sldId id="320" r:id="rId14"/>
+    <p:sldId id="345" r:id="rId7"/>
+    <p:sldId id="338" r:id="rId8"/>
+    <p:sldId id="339" r:id="rId9"/>
+    <p:sldId id="340" r:id="rId10"/>
+    <p:sldId id="341" r:id="rId11"/>
+    <p:sldId id="342" r:id="rId12"/>
+    <p:sldId id="346" r:id="rId13"/>
+    <p:sldId id="343" r:id="rId14"/>
+    <p:sldId id="344" r:id="rId15"/>
+    <p:sldId id="347" r:id="rId16"/>
+    <p:sldId id="320" r:id="rId17"/>
   </p:sldIdLst>
   <p:sldSz cx="12192000" cy="6858000"/>
   <p:notesSz cx="6858000" cy="9144000"/>
@@ -221,7 +224,7 @@
             <a:fld id="{A90430EC-7184-4E0E-BC79-C137F71C9EBF}" type="datetimeFigureOut">
               <a:rPr lang="en-IN" smtClean="0"/>
               <a:pPr/>
-              <a:t>03-06-2024</a:t>
+              <a:t>06-06-2024</a:t>
             </a:fld>
             <a:endParaRPr lang="en-IN"/>
           </a:p>
@@ -677,7 +680,7 @@
             <a:fld id="{78ABE3C1-DBE1-495D-B57B-2849774B866A}" type="datetimeFigureOut">
               <a:rPr lang="en-US" smtClean="0"/>
               <a:pPr/>
-              <a:t>6/3/2024</a:t>
+              <a:t>6/6/2024</a:t>
             </a:fld>
             <a:endParaRPr lang="en-US" dirty="0"/>
           </a:p>
@@ -966,7 +969,7 @@
             <a:fld id="{9D6E9DEC-419B-4CC5-A080-3B06BD5A8291}" type="datetimeFigureOut">
               <a:rPr lang="en-US" smtClean="0"/>
               <a:pPr/>
-              <a:t>6/3/2024</a:t>
+              <a:t>6/6/2024</a:t>
             </a:fld>
             <a:endParaRPr lang="en-US" dirty="0"/>
           </a:p>
@@ -1175,7 +1178,7 @@
             <a:fld id="{9D6E9DEC-419B-4CC5-A080-3B06BD5A8291}" type="datetimeFigureOut">
               <a:rPr lang="en-US" smtClean="0"/>
               <a:pPr/>
-              <a:t>6/3/2024</a:t>
+              <a:t>6/6/2024</a:t>
             </a:fld>
             <a:endParaRPr lang="en-US" dirty="0"/>
           </a:p>
@@ -1463,7 +1466,7 @@
             <a:fld id="{9D6E9DEC-419B-4CC5-A080-3B06BD5A8291}" type="datetimeFigureOut">
               <a:rPr lang="en-US" smtClean="0"/>
               <a:pPr/>
-              <a:t>6/3/2024</a:t>
+              <a:t>6/6/2024</a:t>
             </a:fld>
             <a:endParaRPr lang="en-US" dirty="0"/>
           </a:p>
@@ -1819,7 +1822,7 @@
             <a:fld id="{9D6E9DEC-419B-4CC5-A080-3B06BD5A8291}" type="datetimeFigureOut">
               <a:rPr lang="en-US" smtClean="0"/>
               <a:pPr/>
-              <a:t>6/3/2024</a:t>
+              <a:t>6/6/2024</a:t>
             </a:fld>
             <a:endParaRPr lang="en-US" dirty="0"/>
           </a:p>
@@ -2457,7 +2460,7 @@
             <a:fld id="{9D6E9DEC-419B-4CC5-A080-3B06BD5A8291}" type="datetimeFigureOut">
               <a:rPr lang="en-US" smtClean="0"/>
               <a:pPr/>
-              <a:t>6/3/2024</a:t>
+              <a:t>6/6/2024</a:t>
             </a:fld>
             <a:endParaRPr lang="en-US" dirty="0"/>
           </a:p>
@@ -3332,7 +3335,7 @@
             <a:fld id="{9D6E9DEC-419B-4CC5-A080-3B06BD5A8291}" type="datetimeFigureOut">
               <a:rPr lang="en-US" smtClean="0"/>
               <a:pPr/>
-              <a:t>6/3/2024</a:t>
+              <a:t>6/6/2024</a:t>
             </a:fld>
             <a:endParaRPr lang="en-US" dirty="0"/>
           </a:p>
@@ -3517,7 +3520,7 @@
             <a:fld id="{1FA3F48C-C7C6-4055-9F49-3777875E72AE}" type="datetimeFigureOut">
               <a:rPr lang="en-US" smtClean="0"/>
               <a:pPr/>
-              <a:t>6/3/2024</a:t>
+              <a:t>6/6/2024</a:t>
             </a:fld>
             <a:endParaRPr lang="en-US" dirty="0"/>
           </a:p>
@@ -3711,7 +3714,7 @@
             <a:fld id="{6178E61D-D431-422C-9764-11DAFE33AB63}" type="datetimeFigureOut">
               <a:rPr lang="en-US" smtClean="0"/>
               <a:pPr/>
-              <a:t>6/3/2024</a:t>
+              <a:t>6/6/2024</a:t>
             </a:fld>
             <a:endParaRPr lang="en-US" dirty="0"/>
           </a:p>
@@ -3895,7 +3898,7 @@
             <a:fld id="{12DE42F4-6EEF-4EF7-8ED4-2208F0F89A08}" type="datetimeFigureOut">
               <a:rPr lang="en-US" smtClean="0"/>
               <a:pPr/>
-              <a:t>6/3/2024</a:t>
+              <a:t>6/6/2024</a:t>
             </a:fld>
             <a:endParaRPr lang="en-US" dirty="0"/>
           </a:p>
@@ -4156,7 +4159,7 @@
             <a:fld id="{30578ACC-22D6-47C1-A373-4FD133E34F3C}" type="datetimeFigureOut">
               <a:rPr lang="en-US" smtClean="0"/>
               <a:pPr/>
-              <a:t>6/3/2024</a:t>
+              <a:t>6/6/2024</a:t>
             </a:fld>
             <a:endParaRPr lang="en-US" dirty="0"/>
           </a:p>
@@ -4462,7 +4465,7 @@
             <a:fld id="{4E5A6C69-6797-4E8A-BF37-F2C3751466E9}" type="datetimeFigureOut">
               <a:rPr lang="en-US" smtClean="0"/>
               <a:pPr/>
-              <a:t>6/3/2024</a:t>
+              <a:t>6/6/2024</a:t>
             </a:fld>
             <a:endParaRPr lang="en-US" dirty="0"/>
           </a:p>
@@ -4920,7 +4923,7 @@
             <a:fld id="{D82014A1-A632-4878-A0D3-F52BA7563730}" type="datetimeFigureOut">
               <a:rPr lang="en-US" smtClean="0"/>
               <a:pPr/>
-              <a:t>6/3/2024</a:t>
+              <a:t>6/6/2024</a:t>
             </a:fld>
             <a:endParaRPr lang="en-US" dirty="0"/>
           </a:p>
@@ -5052,7 +5055,7 @@
             <a:fld id="{CE99F462-093F-4566-844B-4C71F2739DA5}" type="datetimeFigureOut">
               <a:rPr lang="en-US" smtClean="0"/>
               <a:pPr/>
-              <a:t>6/3/2024</a:t>
+              <a:t>6/6/2024</a:t>
             </a:fld>
             <a:endParaRPr lang="en-US" dirty="0"/>
           </a:p>
@@ -5161,7 +5164,7 @@
             <a:fld id="{3D24A7AC-904D-4781-85BA-7D10C17ED021}" type="datetimeFigureOut">
               <a:rPr lang="en-US" smtClean="0"/>
               <a:pPr/>
-              <a:t>6/3/2024</a:t>
+              <a:t>6/6/2024</a:t>
             </a:fld>
             <a:endParaRPr lang="en-US" dirty="0"/>
           </a:p>
@@ -5454,7 +5457,7 @@
             <a:fld id="{E331444B-B92B-4E27-8C94-BB93EAF5CB18}" type="datetimeFigureOut">
               <a:rPr lang="en-US" smtClean="0"/>
               <a:pPr/>
-              <a:t>6/3/2024</a:t>
+              <a:t>6/6/2024</a:t>
             </a:fld>
             <a:endParaRPr lang="en-US" dirty="0"/>
           </a:p>
@@ -5743,7 +5746,7 @@
             <a:fld id="{363EFA5E-FA76-400D-B3DC-F0BA90E6D107}" type="datetimeFigureOut">
               <a:rPr lang="en-US" smtClean="0"/>
               <a:pPr/>
-              <a:t>6/3/2024</a:t>
+              <a:t>6/6/2024</a:t>
             </a:fld>
             <a:endParaRPr lang="en-US" dirty="0"/>
           </a:p>
@@ -6186,7 +6189,7 @@
             <a:fld id="{9D6E9DEC-419B-4CC5-A080-3B06BD5A8291}" type="datetimeFigureOut">
               <a:rPr lang="en-US" smtClean="0"/>
               <a:pPr/>
-              <a:t>6/3/2024</a:t>
+              <a:t>6/6/2024</a:t>
             </a:fld>
             <a:endParaRPr lang="en-US" dirty="0"/>
           </a:p>
@@ -6782,17 +6785,18 @@
             </a:r>
           </a:p>
           <a:p>
+            <a:pPr algn="ctr"/>
             <a:r>
               <a:rPr lang="en-IN" sz="2800" b="1" dirty="0">
                 <a:solidFill>
                   <a:schemeClr val="bg1"/>
                 </a:solidFill>
               </a:rPr>
-              <a:t>“</a:t>
+              <a:t>“ </a:t>
             </a:r>
             <a:r>
               <a:rPr lang="en-IN" sz="2800" b="1" dirty="0"/>
-              <a:t>Gesture Control System Using OpenCV</a:t>
+              <a:t>Gesture Control System</a:t>
             </a:r>
             <a:r>
               <a:rPr lang="en-IN" sz="2800" b="1" dirty="0">
@@ -6967,7 +6971,7 @@
                 <a:latin typeface="Times New Roman" pitchFamily="18" charset="0"/>
                 <a:cs typeface="Times New Roman" pitchFamily="18" charset="0"/>
               </a:rPr>
-              <a:t>Manish Sharma (201603011)</a:t>
+              <a:t>Manish Sharma(201603011)</a:t>
             </a:r>
           </a:p>
           <a:p>
@@ -6981,7 +6985,7 @@
                 <a:latin typeface="Times New Roman" pitchFamily="18" charset="0"/>
                 <a:cs typeface="Times New Roman" pitchFamily="18" charset="0"/>
               </a:rPr>
-              <a:t>Raghav Khajuria (201603016)</a:t>
+              <a:t>Raghav Khajuria(201603016)</a:t>
             </a:r>
           </a:p>
           <a:p>
@@ -7040,7 +7044,7 @@
           </a:bodyPr>
           <a:lstStyle/>
           <a:p>
-            <a:pPr lvl="2" algn="ctr"/>
+            <a:pPr lvl="2"/>
             <a:r>
               <a:rPr lang="en-IN" sz="2800" b="1" u="sng" dirty="0">
                 <a:solidFill>
@@ -7056,6 +7060,36 @@
           </a:p>
         </p:txBody>
       </p:sp>
+      <p:pic>
+        <p:nvPicPr>
+          <p:cNvPr id="6" name="Picture 5">
+            <a:extLst>
+              <a:ext uri="{FF2B5EF4-FFF2-40B4-BE49-F238E27FC236}">
+                <a16:creationId xmlns:a16="http://schemas.microsoft.com/office/drawing/2014/main" id="{FE02EAFD-106C-F400-0670-7D8572A87933}"/>
+              </a:ext>
+            </a:extLst>
+          </p:cNvPr>
+          <p:cNvPicPr>
+            <a:picLocks noChangeAspect="1"/>
+          </p:cNvPicPr>
+          <p:nvPr/>
+        </p:nvPicPr>
+        <p:blipFill>
+          <a:blip r:embed="rId2"/>
+          <a:stretch>
+            <a:fillRect/>
+          </a:stretch>
+        </p:blipFill>
+        <p:spPr>
+          <a:xfrm>
+            <a:off x="3191561" y="2543440"/>
+            <a:ext cx="885560" cy="885560"/>
+          </a:xfrm>
+          <a:prstGeom prst="rect">
+            <a:avLst/>
+          </a:prstGeom>
+        </p:spPr>
+      </p:pic>
     </p:spTree>
     <p:extLst>
       <p:ext uri="{BB962C8B-B14F-4D97-AF65-F5344CB8AC3E}">
@@ -7103,7 +7137,7 @@
           <p:cNvPr id="2" name="Title 1">
             <a:extLst>
               <a:ext uri="{FF2B5EF4-FFF2-40B4-BE49-F238E27FC236}">
-                <a16:creationId xmlns:a16="http://schemas.microsoft.com/office/drawing/2014/main" id="{6F11A564-8031-8CBB-872C-1CC74DA0D3B7}"/>
+                <a16:creationId xmlns:a16="http://schemas.microsoft.com/office/drawing/2014/main" id="{2A513F2D-7C0B-5ECE-73AA-B4BF394148B3}"/>
               </a:ext>
             </a:extLst>
           </p:cNvPr>
@@ -7116,8 +7150,8 @@
         </p:nvSpPr>
         <p:spPr>
           <a:xfrm>
-            <a:off x="646112" y="452718"/>
-            <a:ext cx="4850120" cy="933630"/>
+            <a:off x="615632" y="208879"/>
+            <a:ext cx="5892340" cy="776314"/>
           </a:xfrm>
         </p:spPr>
         <p:txBody>
@@ -7125,11 +7159,11 @@
           <a:lstStyle/>
           <a:p>
             <a:r>
-              <a:rPr lang="en-IN" sz="4400" b="1" u="sng" dirty="0">
+              <a:rPr lang="en-IN" sz="4000" b="1" u="sng" dirty="0">
                 <a:latin typeface="Times New Roman" panose="02020603050405020304" pitchFamily="18" charset="0"/>
                 <a:cs typeface="Times New Roman" panose="02020603050405020304" pitchFamily="18" charset="0"/>
               </a:rPr>
-              <a:t>Classifier Models</a:t>
+              <a:t>Other Technologies Used:</a:t>
             </a:r>
             <a:endParaRPr lang="en-IN" dirty="0"/>
           </a:p>
@@ -7137,146 +7171,225 @@
       </p:sp>
       <p:sp>
         <p:nvSpPr>
-          <p:cNvPr id="3" name="Content Placeholder 2">
+          <p:cNvPr id="7" name="TextBox 6">
             <a:extLst>
               <a:ext uri="{FF2B5EF4-FFF2-40B4-BE49-F238E27FC236}">
-                <a16:creationId xmlns:a16="http://schemas.microsoft.com/office/drawing/2014/main" id="{A8040E62-784B-F2DF-C41A-80758A195C6F}"/>
+                <a16:creationId xmlns:a16="http://schemas.microsoft.com/office/drawing/2014/main" id="{6146CA06-5540-7082-DDF3-95DB1F3403A6}"/>
               </a:ext>
             </a:extLst>
           </p:cNvPr>
-          <p:cNvSpPr>
-            <a:spLocks noGrp="1"/>
-          </p:cNvSpPr>
-          <p:nvPr>
-            <p:ph idx="1"/>
-          </p:nvPr>
+          <p:cNvSpPr txBox="1"/>
+          <p:nvPr/>
         </p:nvSpPr>
         <p:spPr>
           <a:xfrm>
-            <a:off x="646112" y="1641987"/>
-            <a:ext cx="9125621" cy="4399935"/>
+            <a:off x="731520" y="1127760"/>
+            <a:ext cx="9306560" cy="5355312"/>
           </a:xfrm>
+          <a:prstGeom prst="rect">
+            <a:avLst/>
+          </a:prstGeom>
+          <a:noFill/>
         </p:spPr>
         <p:txBody>
-          <a:bodyPr>
-            <a:normAutofit/>
+          <a:bodyPr wrap="square" rtlCol="0">
+            <a:spAutoFit/>
           </a:bodyPr>
           <a:lstStyle/>
           <a:p>
-            <a:r>
-              <a:rPr lang="en-IN" sz="2200" b="1" dirty="0">
-                <a:latin typeface="Times New Roman" panose="02020603050405020304" pitchFamily="18" charset="0"/>
-                <a:cs typeface="Times New Roman" panose="02020603050405020304" pitchFamily="18" charset="0"/>
-              </a:rPr>
-              <a:t>KeyPointClassifier: </a:t>
-            </a:r>
-            <a:r>
-              <a:rPr lang="en-US" sz="2200" dirty="0">
-                <a:solidFill>
-                  <a:schemeClr val="tx1">
-                    <a:lumMod val="85000"/>
-                  </a:schemeClr>
-                </a:solidFill>
-                <a:latin typeface="Times New Roman" panose="02020603050405020304" pitchFamily="18" charset="0"/>
-                <a:cs typeface="Times New Roman" panose="02020603050405020304" pitchFamily="18" charset="0"/>
-              </a:rPr>
-              <a:t>The KeyPointClassifier class is responsible for classifying hand gestures based on the detected landmarks.  It loads a pre-trained TensorFlow Lite model </a:t>
-            </a:r>
-            <a:r>
-              <a:rPr lang="en-US" sz="2200" dirty="0">
-                <a:latin typeface="Times New Roman" panose="02020603050405020304" pitchFamily="18" charset="0"/>
-                <a:cs typeface="Times New Roman" panose="02020603050405020304" pitchFamily="18" charset="0"/>
-              </a:rPr>
-              <a:t>(keypoint_classifier.tflite)</a:t>
-            </a:r>
-            <a:r>
-              <a:rPr lang="en-US" sz="2200" dirty="0">
-                <a:solidFill>
-                  <a:schemeClr val="tx1">
-                    <a:lumMod val="85000"/>
-                  </a:schemeClr>
-                </a:solidFill>
-                <a:latin typeface="Times New Roman" panose="02020603050405020304" pitchFamily="18" charset="0"/>
-                <a:cs typeface="Times New Roman" panose="02020603050405020304" pitchFamily="18" charset="0"/>
-              </a:rPr>
-              <a:t> that takes a list of hand landmarks as input and outputs a classification result. It uses CNN algorithm.</a:t>
-            </a:r>
-          </a:p>
-          <a:p>
-            <a:pPr marL="0" indent="0">
-              <a:buNone/>
+            <a:pPr marL="285750" indent="-285750">
+              <a:buFont typeface="Arial" panose="020B0604020202020204" pitchFamily="34" charset="0"/>
+              <a:buChar char="•"/>
             </a:pPr>
-            <a:endParaRPr lang="en-US" sz="2200" dirty="0">
-              <a:solidFill>
-                <a:schemeClr val="tx1">
-                  <a:lumMod val="85000"/>
-                </a:schemeClr>
-              </a:solidFill>
-              <a:latin typeface="Times New Roman" panose="02020603050405020304" pitchFamily="18" charset="0"/>
-              <a:cs typeface="Times New Roman" panose="02020603050405020304" pitchFamily="18" charset="0"/>
-            </a:endParaRPr>
-          </a:p>
-          <a:p>
-            <a:r>
-              <a:rPr lang="en-US" sz="2200" b="1" dirty="0">
-                <a:latin typeface="Times New Roman" panose="02020603050405020304" pitchFamily="18" charset="0"/>
-                <a:cs typeface="Times New Roman" panose="02020603050405020304" pitchFamily="18" charset="0"/>
-              </a:rPr>
-              <a:t>PointHistoryClassification: </a:t>
-            </a:r>
-            <a:r>
-              <a:rPr lang="en-US" sz="2200" dirty="0">
-                <a:solidFill>
-                  <a:schemeClr val="tx1">
-                    <a:lumMod val="85000"/>
-                  </a:schemeClr>
-                </a:solidFill>
-                <a:latin typeface="Times New Roman" panose="02020603050405020304" pitchFamily="18" charset="0"/>
-                <a:cs typeface="Times New Roman" panose="02020603050405020304" pitchFamily="18" charset="0"/>
-              </a:rPr>
-              <a:t>The PointHistoryClassifier class is responsible for classifying finger gestures based on the historical trajectory of a specific hand landmark (e.g., the tip of the index finger) over several frames. It loads a separate TensorFlow Lite model </a:t>
-            </a:r>
-            <a:r>
-              <a:rPr lang="en-US" sz="2200" dirty="0">
-                <a:latin typeface="Times New Roman" panose="02020603050405020304" pitchFamily="18" charset="0"/>
-                <a:cs typeface="Times New Roman" panose="02020603050405020304" pitchFamily="18" charset="0"/>
-              </a:rPr>
-              <a:t>(point_history_classifier.tflite</a:t>
-            </a:r>
-            <a:r>
-              <a:rPr lang="en-US" sz="2200" dirty="0">
-                <a:solidFill>
-                  <a:schemeClr val="tx1">
-                    <a:lumMod val="85000"/>
-                  </a:schemeClr>
-                </a:solidFill>
-                <a:latin typeface="Times New Roman" panose="02020603050405020304" pitchFamily="18" charset="0"/>
-                <a:cs typeface="Times New Roman" panose="02020603050405020304" pitchFamily="18" charset="0"/>
-              </a:rPr>
-              <a:t>) for point history classification.</a:t>
-            </a:r>
-          </a:p>
-          <a:p>
-            <a:pPr marL="0" indent="0">
-              <a:buNone/>
+            <a:r>
+              <a:rPr lang="en-IN" b="1" i="1" dirty="0" err="1"/>
+              <a:t>PyAutoGUI</a:t>
+            </a:r>
+            <a:endParaRPr lang="en-IN" b="1" i="1" dirty="0"/>
+          </a:p>
+          <a:p>
+            <a:pPr marL="285750" indent="-285750">
+              <a:buFont typeface="Arial" panose="020B0604020202020204" pitchFamily="34" charset="0"/>
+              <a:buChar char="•"/>
             </a:pPr>
-            <a:endParaRPr lang="en-US" sz="2200" b="1" dirty="0">
-              <a:latin typeface="Times New Roman" panose="02020603050405020304" pitchFamily="18" charset="0"/>
-              <a:cs typeface="Times New Roman" panose="02020603050405020304" pitchFamily="18" charset="0"/>
-            </a:endParaRPr>
-          </a:p>
-          <a:p>
-            <a:endParaRPr lang="en-IN" sz="2200" b="1" dirty="0">
-              <a:latin typeface="Times New Roman" panose="02020603050405020304" pitchFamily="18" charset="0"/>
-              <a:cs typeface="Times New Roman" panose="02020603050405020304" pitchFamily="18" charset="0"/>
-            </a:endParaRPr>
+            <a:endParaRPr lang="en-IN" b="1" i="1" dirty="0"/>
+          </a:p>
+          <a:p>
+            <a:pPr marL="285750" indent="-285750">
+              <a:buFont typeface="Arial" panose="020B0604020202020204" pitchFamily="34" charset="0"/>
+              <a:buChar char="•"/>
+            </a:pPr>
+            <a:r>
+              <a:rPr lang="en-IN" b="1" i="1" dirty="0" err="1"/>
+              <a:t>Autopy</a:t>
+            </a:r>
+            <a:r>
+              <a:rPr lang="en-IN" b="1" i="1" dirty="0"/>
+              <a:t> </a:t>
+            </a:r>
+          </a:p>
+          <a:p>
+            <a:pPr marL="285750" indent="-285750">
+              <a:buFont typeface="Arial" panose="020B0604020202020204" pitchFamily="34" charset="0"/>
+              <a:buChar char="•"/>
+            </a:pPr>
+            <a:endParaRPr lang="en-IN" b="1" i="1" dirty="0"/>
+          </a:p>
+          <a:p>
+            <a:pPr marL="285750" indent="-285750">
+              <a:buFont typeface="Arial" panose="020B0604020202020204" pitchFamily="34" charset="0"/>
+              <a:buChar char="•"/>
+            </a:pPr>
+            <a:r>
+              <a:rPr lang="en-IN" b="1" i="1" dirty="0" err="1"/>
+              <a:t>Comtypes</a:t>
+            </a:r>
+            <a:r>
+              <a:rPr lang="en-IN" b="1" i="1" dirty="0"/>
+              <a:t> </a:t>
+            </a:r>
+          </a:p>
+          <a:p>
+            <a:pPr marL="285750" indent="-285750">
+              <a:buFont typeface="Arial" panose="020B0604020202020204" pitchFamily="34" charset="0"/>
+              <a:buChar char="•"/>
+            </a:pPr>
+            <a:endParaRPr lang="en-IN" b="1" i="1" dirty="0"/>
+          </a:p>
+          <a:p>
+            <a:pPr marL="285750" indent="-285750">
+              <a:buFont typeface="Arial" panose="020B0604020202020204" pitchFamily="34" charset="0"/>
+              <a:buChar char="•"/>
+            </a:pPr>
+            <a:r>
+              <a:rPr lang="en-IN" b="1" i="1" dirty="0" err="1"/>
+              <a:t>Inno</a:t>
+            </a:r>
+            <a:r>
+              <a:rPr lang="en-IN" b="1" i="1" dirty="0"/>
+              <a:t> Setup </a:t>
+            </a:r>
+          </a:p>
+          <a:p>
+            <a:pPr marL="285750" indent="-285750">
+              <a:buFont typeface="Arial" panose="020B0604020202020204" pitchFamily="34" charset="0"/>
+              <a:buChar char="•"/>
+            </a:pPr>
+            <a:endParaRPr lang="en-IN" b="1" i="1" dirty="0"/>
+          </a:p>
+          <a:p>
+            <a:pPr marL="285750" indent="-285750">
+              <a:buFont typeface="Arial" panose="020B0604020202020204" pitchFamily="34" charset="0"/>
+              <a:buChar char="•"/>
+            </a:pPr>
+            <a:r>
+              <a:rPr lang="en-IN" b="1" i="1" dirty="0" err="1"/>
+              <a:t>cx_freeze</a:t>
+            </a:r>
+            <a:r>
+              <a:rPr lang="en-IN" b="1" i="1" dirty="0"/>
+              <a:t> </a:t>
+            </a:r>
+          </a:p>
+          <a:p>
+            <a:pPr marL="285750" indent="-285750">
+              <a:buFont typeface="Arial" panose="020B0604020202020204" pitchFamily="34" charset="0"/>
+              <a:buChar char="•"/>
+            </a:pPr>
+            <a:endParaRPr lang="en-IN" b="1" i="1" dirty="0"/>
+          </a:p>
+          <a:p>
+            <a:pPr marL="285750" indent="-285750">
+              <a:buFont typeface="Arial" panose="020B0604020202020204" pitchFamily="34" charset="0"/>
+              <a:buChar char="•"/>
+            </a:pPr>
+            <a:r>
+              <a:rPr lang="en-IN" b="1" i="1" dirty="0" err="1"/>
+              <a:t>numpy</a:t>
+            </a:r>
+            <a:r>
+              <a:rPr lang="en-IN" b="1" i="1" dirty="0"/>
+              <a:t> </a:t>
+            </a:r>
+          </a:p>
+          <a:p>
+            <a:pPr marL="285750" indent="-285750">
+              <a:buFont typeface="Arial" panose="020B0604020202020204" pitchFamily="34" charset="0"/>
+              <a:buChar char="•"/>
+            </a:pPr>
+            <a:endParaRPr lang="en-IN" b="1" i="1" dirty="0"/>
+          </a:p>
+          <a:p>
+            <a:pPr marL="285750" indent="-285750">
+              <a:buFont typeface="Arial" panose="020B0604020202020204" pitchFamily="34" charset="0"/>
+              <a:buChar char="•"/>
+            </a:pPr>
+            <a:r>
+              <a:rPr lang="en-IN" b="1" i="1" dirty="0"/>
+              <a:t>time </a:t>
+            </a:r>
+          </a:p>
+          <a:p>
+            <a:pPr marL="285750" indent="-285750">
+              <a:buFont typeface="Arial" panose="020B0604020202020204" pitchFamily="34" charset="0"/>
+              <a:buChar char="•"/>
+            </a:pPr>
+            <a:endParaRPr lang="en-IN" b="1" i="1" dirty="0"/>
+          </a:p>
+          <a:p>
+            <a:pPr marL="285750" indent="-285750">
+              <a:buFont typeface="Arial" panose="020B0604020202020204" pitchFamily="34" charset="0"/>
+              <a:buChar char="•"/>
+            </a:pPr>
+            <a:r>
+              <a:rPr lang="en-IN" b="1" i="1" dirty="0" err="1"/>
+              <a:t>os</a:t>
+            </a:r>
+            <a:r>
+              <a:rPr lang="en-IN" b="1" i="1" dirty="0"/>
+              <a:t> </a:t>
+            </a:r>
+          </a:p>
+          <a:p>
+            <a:pPr marL="285750" indent="-285750">
+              <a:buFont typeface="Arial" panose="020B0604020202020204" pitchFamily="34" charset="0"/>
+              <a:buChar char="•"/>
+            </a:pPr>
+            <a:endParaRPr lang="en-IN" b="1" i="1" dirty="0"/>
+          </a:p>
+          <a:p>
+            <a:pPr marL="285750" indent="-285750">
+              <a:buFont typeface="Arial" panose="020B0604020202020204" pitchFamily="34" charset="0"/>
+              <a:buChar char="•"/>
+            </a:pPr>
+            <a:r>
+              <a:rPr lang="en-IN" b="1" i="1" dirty="0"/>
+              <a:t>keyboard </a:t>
+            </a:r>
+          </a:p>
+          <a:p>
+            <a:pPr marL="285750" indent="-285750">
+              <a:buFont typeface="Arial" panose="020B0604020202020204" pitchFamily="34" charset="0"/>
+              <a:buChar char="•"/>
+            </a:pPr>
+            <a:endParaRPr lang="en-IN" b="1" i="1" dirty="0"/>
+          </a:p>
+          <a:p>
+            <a:pPr marL="285750" indent="-285750">
+              <a:buFont typeface="Arial" panose="020B0604020202020204" pitchFamily="34" charset="0"/>
+              <a:buChar char="•"/>
+            </a:pPr>
+            <a:r>
+              <a:rPr lang="en-IN" b="1" i="1" dirty="0"/>
+              <a:t>math</a:t>
+            </a:r>
           </a:p>
         </p:txBody>
       </p:sp>
     </p:spTree>
     <p:extLst>
       <p:ext uri="{BB962C8B-B14F-4D97-AF65-F5344CB8AC3E}">
-        <p14:creationId xmlns:p14="http://schemas.microsoft.com/office/powerpoint/2010/main" val="246862597"/>
+        <p14:creationId xmlns:p14="http://schemas.microsoft.com/office/powerpoint/2010/main" val="3298281859"/>
       </p:ext>
     </p:extLst>
   </p:cSld>
@@ -7320,7 +7433,7 @@
           <p:cNvPr id="2" name="Title 1">
             <a:extLst>
               <a:ext uri="{FF2B5EF4-FFF2-40B4-BE49-F238E27FC236}">
-                <a16:creationId xmlns:a16="http://schemas.microsoft.com/office/drawing/2014/main" id="{36A76183-4057-833D-A356-E359C95817CF}"/>
+                <a16:creationId xmlns:a16="http://schemas.microsoft.com/office/drawing/2014/main" id="{6F11A564-8031-8CBB-872C-1CC74DA0D3B7}"/>
               </a:ext>
             </a:extLst>
           </p:cNvPr>
@@ -7333,21 +7446,20 @@
         </p:nvSpPr>
         <p:spPr>
           <a:xfrm>
-            <a:off x="646112" y="452718"/>
-            <a:ext cx="9638430" cy="756650"/>
+            <a:off x="544512" y="178398"/>
+            <a:ext cx="4850120" cy="933630"/>
           </a:xfrm>
         </p:spPr>
         <p:txBody>
           <a:bodyPr/>
           <a:lstStyle/>
           <a:p>
-            <a:pPr algn="ctr"/>
-            <a:r>
-              <a:rPr lang="en-IN" sz="4000" b="1" u="sng" dirty="0">
+            <a:r>
+              <a:rPr lang="en-IN" sz="4400" b="1" u="sng" dirty="0" err="1">
                 <a:latin typeface="Times New Roman" panose="02020603050405020304" pitchFamily="18" charset="0"/>
                 <a:cs typeface="Times New Roman" panose="02020603050405020304" pitchFamily="18" charset="0"/>
               </a:rPr>
-              <a:t>Final Output</a:t>
+              <a:t>WorkFlow</a:t>
             </a:r>
             <a:endParaRPr lang="en-IN" dirty="0"/>
           </a:p>
@@ -7355,10 +7467,10 @@
       </p:sp>
       <p:pic>
         <p:nvPicPr>
-          <p:cNvPr id="4" name="Picture 3">
+          <p:cNvPr id="7" name="Picture 6">
             <a:extLst>
               <a:ext uri="{FF2B5EF4-FFF2-40B4-BE49-F238E27FC236}">
-                <a16:creationId xmlns:a16="http://schemas.microsoft.com/office/drawing/2014/main" id="{65BE3ACC-8FAF-1FAB-2D7F-CE6595C22CE0}"/>
+                <a16:creationId xmlns:a16="http://schemas.microsoft.com/office/drawing/2014/main" id="{2B83C50D-FF2A-D1E4-5203-C2151B80BA54}"/>
               </a:ext>
             </a:extLst>
           </p:cNvPr>
@@ -7375,18 +7487,153 @@
         </p:blipFill>
         <p:spPr>
           <a:xfrm>
-            <a:off x="1533832" y="1479043"/>
-            <a:ext cx="8209935" cy="4517908"/>
+            <a:off x="406902" y="1112028"/>
+            <a:ext cx="3474218" cy="5456001"/>
           </a:xfrm>
           <a:prstGeom prst="rect">
             <a:avLst/>
           </a:prstGeom>
         </p:spPr>
       </p:pic>
+      <p:sp>
+        <p:nvSpPr>
+          <p:cNvPr id="8" name="TextBox 7">
+            <a:extLst>
+              <a:ext uri="{FF2B5EF4-FFF2-40B4-BE49-F238E27FC236}">
+                <a16:creationId xmlns:a16="http://schemas.microsoft.com/office/drawing/2014/main" id="{33843939-F44F-F6D9-3A72-C63DA1650A4B}"/>
+              </a:ext>
+            </a:extLst>
+          </p:cNvPr>
+          <p:cNvSpPr txBox="1"/>
+          <p:nvPr/>
+        </p:nvSpPr>
+        <p:spPr>
+          <a:xfrm>
+            <a:off x="4195128" y="1706986"/>
+            <a:ext cx="7702232" cy="3693319"/>
+          </a:xfrm>
+          <a:prstGeom prst="rect">
+            <a:avLst/>
+          </a:prstGeom>
+          <a:noFill/>
+        </p:spPr>
+        <p:txBody>
+          <a:bodyPr wrap="square" rtlCol="0">
+            <a:spAutoFit/>
+          </a:bodyPr>
+          <a:lstStyle/>
+          <a:p>
+            <a:pPr marL="342900" indent="-342900">
+              <a:buFont typeface="+mj-lt"/>
+              <a:buAutoNum type="arabicPeriod"/>
+            </a:pPr>
+            <a:r>
+              <a:rPr lang="en-US" b="1" i="1" dirty="0"/>
+              <a:t>Start</a:t>
+            </a:r>
+            <a:r>
+              <a:rPr lang="en-US" dirty="0"/>
+              <a:t>: Program begins execution.</a:t>
+            </a:r>
+          </a:p>
+          <a:p>
+            <a:pPr marL="342900" indent="-342900">
+              <a:buFont typeface="+mj-lt"/>
+              <a:buAutoNum type="arabicPeriod"/>
+            </a:pPr>
+            <a:endParaRPr lang="en-US" b="1" i="1" dirty="0"/>
+          </a:p>
+          <a:p>
+            <a:pPr marL="342900" indent="-342900">
+              <a:buFont typeface="+mj-lt"/>
+              <a:buAutoNum type="arabicPeriod"/>
+            </a:pPr>
+            <a:r>
+              <a:rPr lang="en-US" b="1" i="1" dirty="0"/>
+              <a:t>Initialize System</a:t>
+            </a:r>
+            <a:r>
+              <a:rPr lang="en-US" dirty="0"/>
+              <a:t>: Set up webcam and hand detector, define frame dimensions and screen size, initialize variables.</a:t>
+            </a:r>
+          </a:p>
+          <a:p>
+            <a:pPr marL="342900" indent="-342900">
+              <a:buFont typeface="+mj-lt"/>
+              <a:buAutoNum type="arabicPeriod"/>
+            </a:pPr>
+            <a:endParaRPr lang="en-US" b="1" i="1" dirty="0"/>
+          </a:p>
+          <a:p>
+            <a:pPr marL="342900" indent="-342900">
+              <a:buFont typeface="+mj-lt"/>
+              <a:buAutoNum type="arabicPeriod"/>
+            </a:pPr>
+            <a:r>
+              <a:rPr lang="en-US" b="1" i="1" dirty="0"/>
+              <a:t>Capture Frame from Webcam</a:t>
+            </a:r>
+            <a:r>
+              <a:rPr lang="en-US" dirty="0"/>
+              <a:t>: Obtain a frame from the webcam using OpenCV.</a:t>
+            </a:r>
+          </a:p>
+          <a:p>
+            <a:pPr marL="342900" indent="-342900">
+              <a:buFont typeface="+mj-lt"/>
+              <a:buAutoNum type="arabicPeriod"/>
+            </a:pPr>
+            <a:endParaRPr lang="en-US" b="1" i="1" dirty="0"/>
+          </a:p>
+          <a:p>
+            <a:pPr marL="342900" indent="-342900">
+              <a:buFont typeface="+mj-lt"/>
+              <a:buAutoNum type="arabicPeriod"/>
+            </a:pPr>
+            <a:r>
+              <a:rPr lang="en-US" b="1" i="1" dirty="0"/>
+              <a:t>Detect Hand in Frame: </a:t>
+            </a:r>
+            <a:r>
+              <a:rPr lang="en-US" dirty="0"/>
+              <a:t>Convert image to RGB and process with </a:t>
+            </a:r>
+            <a:r>
+              <a:rPr lang="en-US" dirty="0" err="1"/>
+              <a:t>Mediapipe</a:t>
+            </a:r>
+            <a:r>
+              <a:rPr lang="en-US" dirty="0"/>
+              <a:t> to detect hand landmarks.</a:t>
+            </a:r>
+          </a:p>
+          <a:p>
+            <a:pPr marL="342900" indent="-342900">
+              <a:buFont typeface="+mj-lt"/>
+              <a:buAutoNum type="arabicPeriod"/>
+            </a:pPr>
+            <a:endParaRPr lang="en-US" b="1" i="1" dirty="0"/>
+          </a:p>
+          <a:p>
+            <a:pPr marL="342900" indent="-342900">
+              <a:buFont typeface="+mj-lt"/>
+              <a:buAutoNum type="arabicPeriod"/>
+            </a:pPr>
+            <a:r>
+              <a:rPr lang="en-US" b="1" i="1" dirty="0"/>
+              <a:t>Check if Hand is Detected:</a:t>
+            </a:r>
+            <a:r>
+              <a:rPr lang="en-US" dirty="0"/>
+              <a:t> Verify if hand landmarks are detected in the frame.</a:t>
+            </a:r>
+          </a:p>
+        </p:txBody>
+      </p:sp>
     </p:spTree>
     <p:extLst>
       <p:ext uri="{BB962C8B-B14F-4D97-AF65-F5344CB8AC3E}">
-        <p14:creationId xmlns:p14="http://schemas.microsoft.com/office/powerpoint/2010/main" val="873599641"/>
+        <p14:creationId xmlns:p14="http://schemas.microsoft.com/office/powerpoint/2010/main" val="246862597"/>
       </p:ext>
     </p:extLst>
   </p:cSld>
@@ -7427,6 +7674,442 @@
       </p:grpSpPr>
       <p:sp>
         <p:nvSpPr>
+          <p:cNvPr id="2" name="TextBox 1">
+            <a:extLst>
+              <a:ext uri="{FF2B5EF4-FFF2-40B4-BE49-F238E27FC236}">
+                <a16:creationId xmlns:a16="http://schemas.microsoft.com/office/drawing/2014/main" id="{5F456172-8BDB-45DC-1E27-9FEB764D6AF0}"/>
+              </a:ext>
+            </a:extLst>
+          </p:cNvPr>
+          <p:cNvSpPr txBox="1"/>
+          <p:nvPr/>
+        </p:nvSpPr>
+        <p:spPr>
+          <a:xfrm>
+            <a:off x="1701800" y="1429940"/>
+            <a:ext cx="8788400" cy="3693319"/>
+          </a:xfrm>
+          <a:prstGeom prst="rect">
+            <a:avLst/>
+          </a:prstGeom>
+          <a:noFill/>
+        </p:spPr>
+        <p:txBody>
+          <a:bodyPr wrap="square" rtlCol="0">
+            <a:spAutoFit/>
+          </a:bodyPr>
+          <a:lstStyle/>
+          <a:p>
+            <a:r>
+              <a:rPr lang="en-US" b="1" i="1" dirty="0"/>
+              <a:t>6. Identify Finger Positions:</a:t>
+            </a:r>
+            <a:r>
+              <a:rPr lang="en-US" dirty="0"/>
+              <a:t> Determine positions of key fingers (index,</a:t>
+            </a:r>
+          </a:p>
+          <a:p>
+            <a:r>
+              <a:rPr lang="en-US" dirty="0"/>
+              <a:t>    middle, thumb) and identify which fingers are raised.</a:t>
+            </a:r>
+          </a:p>
+          <a:p>
+            <a:endParaRPr lang="en-US" b="1" i="1" dirty="0"/>
+          </a:p>
+          <a:p>
+            <a:r>
+              <a:rPr lang="en-US" b="1" i="1" dirty="0"/>
+              <a:t>7. Perform Actions Based on Finger Positions:</a:t>
+            </a:r>
+            <a:r>
+              <a:rPr lang="en-US" dirty="0"/>
+              <a:t> Execute various actions</a:t>
+            </a:r>
+          </a:p>
+          <a:p>
+            <a:r>
+              <a:rPr lang="en-US" dirty="0"/>
+              <a:t>    based on finger positions, such as cursor movement, clicks, right</a:t>
+            </a:r>
+          </a:p>
+          <a:p>
+            <a:r>
+              <a:rPr lang="en-US" dirty="0"/>
+              <a:t>    clicks, dragging, double-clicking, scrolling, and presentation control.</a:t>
+            </a:r>
+          </a:p>
+          <a:p>
+            <a:pPr marL="285750" indent="-285750">
+              <a:buFont typeface="Arial" panose="020B0604020202020204" pitchFamily="34" charset="0"/>
+              <a:buChar char="•"/>
+            </a:pPr>
+            <a:endParaRPr lang="en-US" b="1" i="1" dirty="0"/>
+          </a:p>
+          <a:p>
+            <a:r>
+              <a:rPr lang="en-US" b="1" i="1" dirty="0"/>
+              <a:t>8. Display Frame with Annotations:</a:t>
+            </a:r>
+            <a:r>
+              <a:rPr lang="en-US" dirty="0"/>
+              <a:t> Annotate the frame with detected</a:t>
+            </a:r>
+          </a:p>
+          <a:p>
+            <a:r>
+              <a:rPr lang="en-US" dirty="0"/>
+              <a:t>    landmarks and visual cues using OpenCV and display it in a window.</a:t>
+            </a:r>
+          </a:p>
+          <a:p>
+            <a:pPr marL="285750" indent="-285750">
+              <a:buFont typeface="Arial" panose="020B0604020202020204" pitchFamily="34" charset="0"/>
+              <a:buChar char="•"/>
+            </a:pPr>
+            <a:endParaRPr lang="en-US" b="1" i="1" dirty="0"/>
+          </a:p>
+          <a:p>
+            <a:r>
+              <a:rPr lang="en-US" b="1" i="1" dirty="0"/>
+              <a:t>9. Check for Exit Condition</a:t>
+            </a:r>
+            <a:r>
+              <a:rPr lang="en-US" dirty="0"/>
+              <a:t>: Monitor if the 'Esc' key is pressed to stop the script.</a:t>
+            </a:r>
+          </a:p>
+          <a:p>
+            <a:pPr marL="285750" indent="-285750">
+              <a:buFont typeface="Arial" panose="020B0604020202020204" pitchFamily="34" charset="0"/>
+              <a:buChar char="•"/>
+            </a:pPr>
+            <a:endParaRPr lang="en-US" b="1" i="1" dirty="0"/>
+          </a:p>
+          <a:p>
+            <a:r>
+              <a:rPr lang="en-US" b="1" i="1" dirty="0"/>
+              <a:t>10. End</a:t>
+            </a:r>
+            <a:r>
+              <a:rPr lang="en-US" dirty="0"/>
+              <a:t>: Release webcam resource and close all OpenCV windows.</a:t>
+            </a:r>
+            <a:endParaRPr lang="en-IN" dirty="0"/>
+          </a:p>
+        </p:txBody>
+      </p:sp>
+    </p:spTree>
+    <p:extLst>
+      <p:ext uri="{BB962C8B-B14F-4D97-AF65-F5344CB8AC3E}">
+        <p14:creationId xmlns:p14="http://schemas.microsoft.com/office/powerpoint/2010/main" val="1504446881"/>
+      </p:ext>
+    </p:extLst>
+  </p:cSld>
+  <p:clrMapOvr>
+    <a:masterClrMapping/>
+  </p:clrMapOvr>
+  <mc:AlternateContent xmlns:mc="http://schemas.openxmlformats.org/markup-compatibility/2006" xmlns:p15="http://schemas.microsoft.com/office/powerpoint/2012/main">
+    <mc:Choice Requires="p15">
+      <p:transition xmlns:p14="http://schemas.microsoft.com/office/powerpoint/2010/main" spd="slow" p14:dur="1250">
+        <p15:prstTrans prst="pageCurlDouble"/>
+      </p:transition>
+    </mc:Choice>
+    <mc:Fallback xmlns="">
+      <p:transition spd="slow">
+        <p:fade/>
+      </p:transition>
+    </mc:Fallback>
+  </mc:AlternateContent>
+</p:sld>
+</file>
+
+<file path=ppt/slides/slide13.xml><?xml version="1.0" encoding="utf-8"?>
+<p:sld xmlns:a="http://schemas.openxmlformats.org/drawingml/2006/main" xmlns:r="http://schemas.openxmlformats.org/officeDocument/2006/relationships" xmlns:p="http://schemas.openxmlformats.org/presentationml/2006/main">
+  <p:cSld>
+    <p:spTree>
+      <p:nvGrpSpPr>
+        <p:cNvPr id="1" name=""/>
+        <p:cNvGrpSpPr/>
+        <p:nvPr/>
+      </p:nvGrpSpPr>
+      <p:grpSpPr>
+        <a:xfrm>
+          <a:off x="0" y="0"/>
+          <a:ext cx="0" cy="0"/>
+          <a:chOff x="0" y="0"/>
+          <a:chExt cx="0" cy="0"/>
+        </a:xfrm>
+      </p:grpSpPr>
+      <p:sp>
+        <p:nvSpPr>
+          <p:cNvPr id="6" name="Title 1">
+            <a:extLst>
+              <a:ext uri="{FF2B5EF4-FFF2-40B4-BE49-F238E27FC236}">
+                <a16:creationId xmlns:a16="http://schemas.microsoft.com/office/drawing/2014/main" id="{C6562093-541A-BDA9-A388-9EBBA6395242}"/>
+              </a:ext>
+            </a:extLst>
+          </p:cNvPr>
+          <p:cNvSpPr>
+            <a:spLocks noGrp="1"/>
+          </p:cNvSpPr>
+          <p:nvPr>
+            <p:ph type="title"/>
+          </p:nvPr>
+        </p:nvSpPr>
+        <p:spPr>
+          <a:xfrm>
+            <a:off x="544512" y="178398"/>
+            <a:ext cx="4850120" cy="933630"/>
+          </a:xfrm>
+        </p:spPr>
+        <p:txBody>
+          <a:bodyPr/>
+          <a:lstStyle/>
+          <a:p>
+            <a:r>
+              <a:rPr lang="en-IN" sz="4400" b="1" u="sng" dirty="0">
+                <a:latin typeface="Times New Roman" panose="02020603050405020304" pitchFamily="18" charset="0"/>
+                <a:cs typeface="Times New Roman" panose="02020603050405020304" pitchFamily="18" charset="0"/>
+              </a:rPr>
+              <a:t>Applications:</a:t>
+            </a:r>
+            <a:endParaRPr lang="en-IN" dirty="0"/>
+          </a:p>
+        </p:txBody>
+      </p:sp>
+      <p:sp>
+        <p:nvSpPr>
+          <p:cNvPr id="7" name="TextBox 6">
+            <a:extLst>
+              <a:ext uri="{FF2B5EF4-FFF2-40B4-BE49-F238E27FC236}">
+                <a16:creationId xmlns:a16="http://schemas.microsoft.com/office/drawing/2014/main" id="{B8846EF7-BD51-CB5C-F13C-A04721780E1A}"/>
+              </a:ext>
+            </a:extLst>
+          </p:cNvPr>
+          <p:cNvSpPr txBox="1"/>
+          <p:nvPr/>
+        </p:nvSpPr>
+        <p:spPr>
+          <a:xfrm>
+            <a:off x="660072" y="1112028"/>
+            <a:ext cx="9469120" cy="2862322"/>
+          </a:xfrm>
+          <a:prstGeom prst="rect">
+            <a:avLst/>
+          </a:prstGeom>
+          <a:noFill/>
+        </p:spPr>
+        <p:txBody>
+          <a:bodyPr wrap="square" rtlCol="0">
+            <a:spAutoFit/>
+          </a:bodyPr>
+          <a:lstStyle/>
+          <a:p>
+            <a:r>
+              <a:rPr lang="en-US" b="1" i="1" dirty="0"/>
+              <a:t>1. </a:t>
+            </a:r>
+            <a:r>
+              <a:rPr lang="en-IN" b="1" i="1" dirty="0"/>
+              <a:t>Education and Business</a:t>
+            </a:r>
+          </a:p>
+          <a:p>
+            <a:pPr marL="742950" lvl="1" indent="-285750">
+              <a:buFont typeface="Arial" panose="020B0604020202020204" pitchFamily="34" charset="0"/>
+              <a:buChar char="•"/>
+            </a:pPr>
+            <a:endParaRPr lang="en-IN" dirty="0"/>
+          </a:p>
+          <a:p>
+            <a:pPr marL="742950" lvl="1" indent="-285750">
+              <a:buFont typeface="Arial" panose="020B0604020202020204" pitchFamily="34" charset="0"/>
+              <a:buChar char="•"/>
+            </a:pPr>
+            <a:r>
+              <a:rPr lang="en-IN" dirty="0"/>
+              <a:t>Interactive Presentations</a:t>
+            </a:r>
+          </a:p>
+          <a:p>
+            <a:pPr marL="742950" lvl="1" indent="-285750">
+              <a:buFont typeface="Arial" panose="020B0604020202020204" pitchFamily="34" charset="0"/>
+              <a:buChar char="•"/>
+            </a:pPr>
+            <a:r>
+              <a:rPr lang="en-IN" dirty="0"/>
+              <a:t>Multimedia Control</a:t>
+            </a:r>
+          </a:p>
+          <a:p>
+            <a:pPr marL="742950" lvl="1" indent="-285750">
+              <a:buFont typeface="Arial" panose="020B0604020202020204" pitchFamily="34" charset="0"/>
+              <a:buChar char="•"/>
+            </a:pPr>
+            <a:r>
+              <a:rPr lang="en-IN" dirty="0"/>
+              <a:t>Accessibility</a:t>
+            </a:r>
+          </a:p>
+          <a:p>
+            <a:pPr marL="742950" lvl="1" indent="-285750">
+              <a:buFont typeface="Arial" panose="020B0604020202020204" pitchFamily="34" charset="0"/>
+              <a:buChar char="•"/>
+            </a:pPr>
+            <a:r>
+              <a:rPr lang="en-IN" dirty="0"/>
+              <a:t>Enhanced Mobility</a:t>
+            </a:r>
+          </a:p>
+          <a:p>
+            <a:pPr marL="742950" lvl="1" indent="-285750">
+              <a:buFont typeface="Arial" panose="020B0604020202020204" pitchFamily="34" charset="0"/>
+              <a:buChar char="•"/>
+            </a:pPr>
+            <a:endParaRPr lang="en-IN" dirty="0"/>
+          </a:p>
+          <a:p>
+            <a:pPr marL="742950" lvl="1" indent="-285750">
+              <a:buFont typeface="Arial" panose="020B0604020202020204" pitchFamily="34" charset="0"/>
+              <a:buChar char="•"/>
+            </a:pPr>
+            <a:endParaRPr lang="en-IN" dirty="0"/>
+          </a:p>
+          <a:p>
+            <a:pPr marL="742950" lvl="1" indent="-285750">
+              <a:buFont typeface="Arial" panose="020B0604020202020204" pitchFamily="34" charset="0"/>
+              <a:buChar char="•"/>
+            </a:pPr>
+            <a:endParaRPr lang="en-IN" dirty="0"/>
+          </a:p>
+          <a:p>
+            <a:pPr lvl="1"/>
+            <a:endParaRPr lang="en-IN" dirty="0"/>
+          </a:p>
+        </p:txBody>
+      </p:sp>
+      <p:sp>
+        <p:nvSpPr>
+          <p:cNvPr id="8" name="TextBox 7">
+            <a:extLst>
+              <a:ext uri="{FF2B5EF4-FFF2-40B4-BE49-F238E27FC236}">
+                <a16:creationId xmlns:a16="http://schemas.microsoft.com/office/drawing/2014/main" id="{574C3AEE-49E2-13D3-2145-1E2646581930}"/>
+              </a:ext>
+            </a:extLst>
+          </p:cNvPr>
+          <p:cNvSpPr txBox="1"/>
+          <p:nvPr/>
+        </p:nvSpPr>
+        <p:spPr>
+          <a:xfrm>
+            <a:off x="660072" y="2887682"/>
+            <a:ext cx="9519920" cy="3970318"/>
+          </a:xfrm>
+          <a:prstGeom prst="rect">
+            <a:avLst/>
+          </a:prstGeom>
+          <a:noFill/>
+        </p:spPr>
+        <p:txBody>
+          <a:bodyPr wrap="square" rtlCol="0">
+            <a:spAutoFit/>
+          </a:bodyPr>
+          <a:lstStyle/>
+          <a:p>
+            <a:r>
+              <a:rPr lang="en-US" b="1" dirty="0"/>
+              <a:t>2. Healthcare</a:t>
+            </a:r>
+            <a:r>
+              <a:rPr lang="en-US" dirty="0"/>
+              <a:t> </a:t>
+            </a:r>
+          </a:p>
+          <a:p>
+            <a:endParaRPr lang="en-US" dirty="0"/>
+          </a:p>
+          <a:p>
+            <a:r>
+              <a:rPr lang="en-US" dirty="0"/>
+              <a:t>Gesture control can be utilized in medical simulations and training programs to simulate surgical procedures, manipulate medical images, and interact with virtual patient data.</a:t>
+            </a:r>
+          </a:p>
+          <a:p>
+            <a:endParaRPr lang="en-US" dirty="0"/>
+          </a:p>
+          <a:p>
+            <a:r>
+              <a:rPr lang="en-US" dirty="0"/>
+              <a:t>3. </a:t>
+            </a:r>
+            <a:r>
+              <a:rPr lang="en-US" b="1" dirty="0"/>
+              <a:t>Gaming and Entertainment</a:t>
+            </a:r>
+          </a:p>
+          <a:p>
+            <a:endParaRPr lang="en-US" b="1" dirty="0"/>
+          </a:p>
+          <a:p>
+            <a:r>
+              <a:rPr lang="en-US" dirty="0"/>
+              <a:t>Gesture control can enhance gaming experiences by allowing players to interact with games using natural hand movements, gestures, and motions. Gesture control can enable users to interact with virtual environments, manipulate objects, and engage in immersive experiences without the need for physical controllers.</a:t>
+            </a:r>
+          </a:p>
+          <a:p>
+            <a:endParaRPr lang="en-US" dirty="0"/>
+          </a:p>
+          <a:p>
+            <a:endParaRPr lang="en-IN" dirty="0"/>
+          </a:p>
+        </p:txBody>
+      </p:sp>
+    </p:spTree>
+    <p:extLst>
+      <p:ext uri="{BB962C8B-B14F-4D97-AF65-F5344CB8AC3E}">
+        <p14:creationId xmlns:p14="http://schemas.microsoft.com/office/powerpoint/2010/main" val="873599641"/>
+      </p:ext>
+    </p:extLst>
+  </p:cSld>
+  <p:clrMapOvr>
+    <a:masterClrMapping/>
+  </p:clrMapOvr>
+  <mc:AlternateContent xmlns:mc="http://schemas.openxmlformats.org/markup-compatibility/2006" xmlns:p15="http://schemas.microsoft.com/office/powerpoint/2012/main">
+    <mc:Choice Requires="p15">
+      <p:transition xmlns:p14="http://schemas.microsoft.com/office/powerpoint/2010/main" spd="slow" p14:dur="1250">
+        <p15:prstTrans prst="pageCurlDouble"/>
+      </p:transition>
+    </mc:Choice>
+    <mc:Fallback xmlns="">
+      <p:transition spd="slow">
+        <p:fade/>
+      </p:transition>
+    </mc:Fallback>
+  </mc:AlternateContent>
+</p:sld>
+</file>
+
+<file path=ppt/slides/slide14.xml><?xml version="1.0" encoding="utf-8"?>
+<p:sld xmlns:a="http://schemas.openxmlformats.org/drawingml/2006/main" xmlns:r="http://schemas.openxmlformats.org/officeDocument/2006/relationships" xmlns:p="http://schemas.openxmlformats.org/presentationml/2006/main">
+  <p:cSld>
+    <p:spTree>
+      <p:nvGrpSpPr>
+        <p:cNvPr id="1" name=""/>
+        <p:cNvGrpSpPr/>
+        <p:nvPr/>
+      </p:nvGrpSpPr>
+      <p:grpSpPr>
+        <a:xfrm>
+          <a:off x="0" y="0"/>
+          <a:ext cx="0" cy="0"/>
+          <a:chOff x="0" y="0"/>
+          <a:chExt cx="0" cy="0"/>
+        </a:xfrm>
+      </p:grpSpPr>
+      <p:sp>
+        <p:nvSpPr>
           <p:cNvPr id="2" name="Title 1">
             <a:extLst>
               <a:ext uri="{FF2B5EF4-FFF2-40B4-BE49-F238E27FC236}">
@@ -7441,7 +8124,12 @@
             <p:ph type="title"/>
           </p:nvPr>
         </p:nvSpPr>
-        <p:spPr/>
+        <p:spPr>
+          <a:xfrm>
+            <a:off x="625791" y="279998"/>
+            <a:ext cx="9404723" cy="1400530"/>
+          </a:xfrm>
+        </p:spPr>
         <p:txBody>
           <a:bodyPr/>
           <a:lstStyle/>
@@ -7451,7 +8139,7 @@
                 <a:latin typeface="Times New Roman" panose="02020603050405020304" pitchFamily="18" charset="0"/>
                 <a:cs typeface="Times New Roman" panose="02020603050405020304" pitchFamily="18" charset="0"/>
               </a:rPr>
-              <a:t>Future Scope</a:t>
+              <a:t>Challenges:</a:t>
             </a:r>
             <a:endParaRPr lang="en-IN" dirty="0"/>
           </a:p>
@@ -7459,202 +8147,67 @@
       </p:sp>
       <p:sp>
         <p:nvSpPr>
-          <p:cNvPr id="3" name="Content Placeholder 2">
+          <p:cNvPr id="6" name="TextBox 5">
             <a:extLst>
               <a:ext uri="{FF2B5EF4-FFF2-40B4-BE49-F238E27FC236}">
-                <a16:creationId xmlns:a16="http://schemas.microsoft.com/office/drawing/2014/main" id="{C7E947F7-6EFE-A772-1450-95AE75EB25A6}"/>
+                <a16:creationId xmlns:a16="http://schemas.microsoft.com/office/drawing/2014/main" id="{F4F496B9-7F3C-E3F9-B7E4-27171EAFA4CD}"/>
               </a:ext>
             </a:extLst>
           </p:cNvPr>
-          <p:cNvSpPr>
-            <a:spLocks noGrp="1"/>
-          </p:cNvSpPr>
-          <p:nvPr>
-            <p:ph idx="1"/>
-          </p:nvPr>
+          <p:cNvSpPr txBox="1"/>
+          <p:nvPr/>
         </p:nvSpPr>
         <p:spPr>
           <a:xfrm>
-            <a:off x="646111" y="1433486"/>
-            <a:ext cx="9589271" cy="5129112"/>
+            <a:off x="625791" y="1483360"/>
+            <a:ext cx="9865360" cy="3416320"/>
           </a:xfrm>
+          <a:prstGeom prst="rect">
+            <a:avLst/>
+          </a:prstGeom>
+          <a:noFill/>
         </p:spPr>
         <p:txBody>
-          <a:bodyPr>
-            <a:normAutofit/>
+          <a:bodyPr wrap="square" rtlCol="0">
+            <a:spAutoFit/>
           </a:bodyPr>
           <a:lstStyle/>
           <a:p>
             <a:r>
-              <a:rPr lang="en-IN" dirty="0">
-                <a:latin typeface="Times New Roman" panose="02020603050405020304" pitchFamily="18" charset="0"/>
-                <a:cs typeface="Times New Roman" panose="02020603050405020304" pitchFamily="18" charset="0"/>
-              </a:rPr>
-              <a:t>We will develop </a:t>
-            </a:r>
-            <a:r>
-              <a:rPr lang="en-US" b="0" i="0" dirty="0">
-                <a:solidFill>
-                  <a:srgbClr val="ECECF1"/>
-                </a:solidFill>
-                <a:effectLst/>
-                <a:latin typeface="Times New Roman" panose="02020603050405020304" pitchFamily="18" charset="0"/>
-                <a:cs typeface="Times New Roman" panose="02020603050405020304" pitchFamily="18" charset="0"/>
-              </a:rPr>
-              <a:t>Touchless Navigation System used to perform specific functions like moving slides next, volume up and down or zoom in and zoom out in a device without actually touching the screen or using any device such as keyboard or mouse.</a:t>
-            </a:r>
-            <a:r>
-              <a:rPr lang="en-IN" dirty="0">
-                <a:latin typeface="Times New Roman" panose="02020603050405020304" pitchFamily="18" charset="0"/>
-                <a:cs typeface="Times New Roman" panose="02020603050405020304" pitchFamily="18" charset="0"/>
-              </a:rPr>
-              <a:t> </a:t>
-            </a:r>
-          </a:p>
-          <a:p>
-            <a:r>
-              <a:rPr lang="en-IN" dirty="0">
-                <a:latin typeface="Times New Roman" panose="02020603050405020304" pitchFamily="18" charset="0"/>
-                <a:cs typeface="Times New Roman" panose="02020603050405020304" pitchFamily="18" charset="0"/>
-              </a:rPr>
-              <a:t>We will define new gestures such as:</a:t>
-            </a:r>
-          </a:p>
-          <a:p>
-            <a:pPr algn="l">
-              <a:buFont typeface="Arial" panose="020B0604020202020204" pitchFamily="34" charset="0"/>
-              <a:buChar char="•"/>
-            </a:pPr>
-            <a:r>
-              <a:rPr lang="en-US" b="0" i="0" dirty="0">
-                <a:solidFill>
-                  <a:schemeClr val="tx1">
-                    <a:lumMod val="85000"/>
-                  </a:schemeClr>
-                </a:solidFill>
-                <a:effectLst/>
-                <a:latin typeface="Times New Roman" panose="02020603050405020304" pitchFamily="18" charset="0"/>
-                <a:cs typeface="Times New Roman" panose="02020603050405020304" pitchFamily="18" charset="0"/>
-              </a:rPr>
-              <a:t>Moving slides forward: A swipe gesture to the right.</a:t>
-            </a:r>
-          </a:p>
-          <a:p>
-            <a:pPr algn="l">
-              <a:buFont typeface="Arial" panose="020B0604020202020204" pitchFamily="34" charset="0"/>
-              <a:buChar char="•"/>
-            </a:pPr>
-            <a:r>
-              <a:rPr lang="en-US" b="0" i="0" dirty="0">
-                <a:solidFill>
-                  <a:schemeClr val="tx1">
-                    <a:lumMod val="85000"/>
-                  </a:schemeClr>
-                </a:solidFill>
-                <a:effectLst/>
-                <a:latin typeface="Times New Roman" panose="02020603050405020304" pitchFamily="18" charset="0"/>
-                <a:cs typeface="Times New Roman" panose="02020603050405020304" pitchFamily="18" charset="0"/>
-              </a:rPr>
-              <a:t>Moving slides backward: A swipe gesture to the left.</a:t>
-            </a:r>
-          </a:p>
-          <a:p>
-            <a:pPr algn="l">
-              <a:buFont typeface="Arial" panose="020B0604020202020204" pitchFamily="34" charset="0"/>
-              <a:buChar char="•"/>
-            </a:pPr>
-            <a:r>
-              <a:rPr lang="en-US" b="0" i="0" dirty="0">
-                <a:solidFill>
-                  <a:schemeClr val="tx1">
-                    <a:lumMod val="85000"/>
-                  </a:schemeClr>
-                </a:solidFill>
-                <a:effectLst/>
-                <a:latin typeface="Times New Roman" panose="02020603050405020304" pitchFamily="18" charset="0"/>
-                <a:cs typeface="Times New Roman" panose="02020603050405020304" pitchFamily="18" charset="0"/>
-              </a:rPr>
-              <a:t>Volume up: A circular motion with the hand in a specific direction.</a:t>
-            </a:r>
-          </a:p>
-          <a:p>
-            <a:pPr algn="l">
-              <a:buFont typeface="Arial" panose="020B0604020202020204" pitchFamily="34" charset="0"/>
-              <a:buChar char="•"/>
-            </a:pPr>
-            <a:r>
-              <a:rPr lang="en-US" b="0" i="0" dirty="0">
-                <a:solidFill>
-                  <a:schemeClr val="tx1">
-                    <a:lumMod val="85000"/>
-                  </a:schemeClr>
-                </a:solidFill>
-                <a:effectLst/>
-                <a:latin typeface="Times New Roman" panose="02020603050405020304" pitchFamily="18" charset="0"/>
-                <a:cs typeface="Times New Roman" panose="02020603050405020304" pitchFamily="18" charset="0"/>
-              </a:rPr>
-              <a:t>Volume down: A circular motion in the opposite direction.</a:t>
-            </a:r>
-          </a:p>
-          <a:p>
-            <a:pPr algn="l">
-              <a:buFont typeface="Arial" panose="020B0604020202020204" pitchFamily="34" charset="0"/>
-              <a:buChar char="•"/>
-            </a:pPr>
-            <a:r>
-              <a:rPr lang="en-US" b="0" i="0" dirty="0">
-                <a:solidFill>
-                  <a:schemeClr val="tx1">
-                    <a:lumMod val="85000"/>
-                  </a:schemeClr>
-                </a:solidFill>
-                <a:effectLst/>
-                <a:latin typeface="Times New Roman" panose="02020603050405020304" pitchFamily="18" charset="0"/>
-                <a:cs typeface="Times New Roman" panose="02020603050405020304" pitchFamily="18" charset="0"/>
-              </a:rPr>
-              <a:t>Zoom in: A pinch gesture with two fingers.</a:t>
-            </a:r>
-          </a:p>
-          <a:p>
-            <a:pPr algn="l">
-              <a:buFont typeface="Arial" panose="020B0604020202020204" pitchFamily="34" charset="0"/>
-              <a:buChar char="•"/>
-            </a:pPr>
-            <a:r>
-              <a:rPr lang="en-US" b="0" i="0" dirty="0">
-                <a:solidFill>
-                  <a:schemeClr val="tx1">
-                    <a:lumMod val="85000"/>
-                  </a:schemeClr>
-                </a:solidFill>
-                <a:effectLst/>
-                <a:latin typeface="Times New Roman" panose="02020603050405020304" pitchFamily="18" charset="0"/>
-                <a:cs typeface="Times New Roman" panose="02020603050405020304" pitchFamily="18" charset="0"/>
-              </a:rPr>
-              <a:t>Zoom out: A spread gesture with two fingers.</a:t>
-            </a:r>
-            <a:endParaRPr lang="en-IN" dirty="0">
-              <a:latin typeface="Times New Roman" panose="02020603050405020304" pitchFamily="18" charset="0"/>
-              <a:cs typeface="Times New Roman" panose="02020603050405020304" pitchFamily="18" charset="0"/>
-            </a:endParaRPr>
-          </a:p>
-          <a:p>
-            <a:r>
-              <a:rPr lang="en-IN" dirty="0">
-                <a:latin typeface="Times New Roman" panose="02020603050405020304" pitchFamily="18" charset="0"/>
-                <a:cs typeface="Times New Roman" panose="02020603050405020304" pitchFamily="18" charset="0"/>
-              </a:rPr>
-              <a:t>We will extend the classification logic with more advancements.</a:t>
-            </a:r>
-          </a:p>
-          <a:p>
-            <a:pPr marL="0" indent="0">
-              <a:buNone/>
-            </a:pPr>
-            <a:endParaRPr lang="en-IN" dirty="0">
-              <a:latin typeface="Times New Roman" panose="02020603050405020304" pitchFamily="18" charset="0"/>
-              <a:cs typeface="Times New Roman" panose="02020603050405020304" pitchFamily="18" charset="0"/>
-            </a:endParaRPr>
+              <a:rPr lang="en-US" b="1" i="1" dirty="0"/>
+              <a:t>Hand Detection Accuracy</a:t>
+            </a:r>
+            <a:r>
+              <a:rPr lang="en-US" dirty="0"/>
+              <a:t>: Variations in lighting, hand sizes, and occlusions challenge achieving precise hand detection, requiring sophisticated algorithms and parameter tuning for robustness.</a:t>
+            </a:r>
+          </a:p>
+          <a:p>
+            <a:endParaRPr lang="en-US" dirty="0"/>
+          </a:p>
+          <a:p>
+            <a:r>
+              <a:rPr lang="en-US" b="1" i="1" dirty="0"/>
+              <a:t>Real-time Responsiveness</a:t>
+            </a:r>
+            <a:r>
+              <a:rPr lang="en-US" dirty="0"/>
+              <a:t>: Balancing seamless user experience with minimal latency in translating hand movements into mouse actions is challenging, especially with resource-intensive image processing tasks and complex gesture recognition algorithms.</a:t>
+            </a:r>
+          </a:p>
+          <a:p>
+            <a:endParaRPr lang="en-US" dirty="0"/>
+          </a:p>
+          <a:p>
+            <a:r>
+              <a:rPr lang="en-US" b="1" i="1" dirty="0"/>
+              <a:t>Limitation to Specific Presentation File</a:t>
+            </a:r>
+            <a:r>
+              <a:rPr lang="en-US" dirty="0"/>
+              <a:t>: Dependency on a specific presentation file in the program folder limits flexibility and usability, requiring users to store the presentation file within the program directory, potentially leading to errors if requirements are not met.</a:t>
+            </a:r>
+            <a:endParaRPr lang="en-IN" dirty="0"/>
           </a:p>
         </p:txBody>
       </p:sp>
@@ -7683,7 +8236,152 @@
 </p:sld>
 </file>
 
-<file path=ppt/slides/slide13.xml><?xml version="1.0" encoding="utf-8"?>
+<file path=ppt/slides/slide15.xml><?xml version="1.0" encoding="utf-8"?>
+<p:sld xmlns:a="http://schemas.openxmlformats.org/drawingml/2006/main" xmlns:r="http://schemas.openxmlformats.org/officeDocument/2006/relationships" xmlns:p="http://schemas.openxmlformats.org/presentationml/2006/main">
+  <p:cSld>
+    <p:spTree>
+      <p:nvGrpSpPr>
+        <p:cNvPr id="1" name=""/>
+        <p:cNvGrpSpPr/>
+        <p:nvPr/>
+      </p:nvGrpSpPr>
+      <p:grpSpPr>
+        <a:xfrm>
+          <a:off x="0" y="0"/>
+          <a:ext cx="0" cy="0"/>
+          <a:chOff x="0" y="0"/>
+          <a:chExt cx="0" cy="0"/>
+        </a:xfrm>
+      </p:grpSpPr>
+      <p:sp>
+        <p:nvSpPr>
+          <p:cNvPr id="4" name="Title 1">
+            <a:extLst>
+              <a:ext uri="{FF2B5EF4-FFF2-40B4-BE49-F238E27FC236}">
+                <a16:creationId xmlns:a16="http://schemas.microsoft.com/office/drawing/2014/main" id="{D364FC12-EFDF-6396-5485-F7E4D8C8D910}"/>
+              </a:ext>
+            </a:extLst>
+          </p:cNvPr>
+          <p:cNvSpPr>
+            <a:spLocks noGrp="1"/>
+          </p:cNvSpPr>
+          <p:nvPr>
+            <p:ph type="title"/>
+          </p:nvPr>
+        </p:nvSpPr>
+        <p:spPr>
+          <a:xfrm>
+            <a:off x="625791" y="279998"/>
+            <a:ext cx="9404723" cy="1400530"/>
+          </a:xfrm>
+        </p:spPr>
+        <p:txBody>
+          <a:bodyPr/>
+          <a:lstStyle/>
+          <a:p>
+            <a:r>
+              <a:rPr lang="en-IN" sz="4000" b="1" u="sng" dirty="0">
+                <a:latin typeface="Times New Roman" panose="02020603050405020304" pitchFamily="18" charset="0"/>
+                <a:cs typeface="Times New Roman" panose="02020603050405020304" pitchFamily="18" charset="0"/>
+              </a:rPr>
+              <a:t>Future Scope:</a:t>
+            </a:r>
+            <a:endParaRPr lang="en-IN" dirty="0"/>
+          </a:p>
+        </p:txBody>
+      </p:sp>
+      <p:sp>
+        <p:nvSpPr>
+          <p:cNvPr id="5" name="TextBox 4">
+            <a:extLst>
+              <a:ext uri="{FF2B5EF4-FFF2-40B4-BE49-F238E27FC236}">
+                <a16:creationId xmlns:a16="http://schemas.microsoft.com/office/drawing/2014/main" id="{A8EACD02-6182-4139-5B30-612B887C18FA}"/>
+              </a:ext>
+            </a:extLst>
+          </p:cNvPr>
+          <p:cNvSpPr txBox="1"/>
+          <p:nvPr/>
+        </p:nvSpPr>
+        <p:spPr>
+          <a:xfrm>
+            <a:off x="625791" y="1341120"/>
+            <a:ext cx="9404723" cy="3970318"/>
+          </a:xfrm>
+          <a:prstGeom prst="rect">
+            <a:avLst/>
+          </a:prstGeom>
+          <a:noFill/>
+        </p:spPr>
+        <p:txBody>
+          <a:bodyPr wrap="square" rtlCol="0">
+            <a:spAutoFit/>
+          </a:bodyPr>
+          <a:lstStyle/>
+          <a:p>
+            <a:r>
+              <a:rPr lang="en-US" b="1" i="1" dirty="0"/>
+              <a:t>Improved Accuracy and Speed:</a:t>
+            </a:r>
+            <a:r>
+              <a:rPr lang="en-US" dirty="0"/>
+              <a:t> Incorporating advanced machine learning models and GPU acceleration can enhance the system's accuracy and speed, ensuring more precise hand detection and faster gesture recognition for a seamless user experience.</a:t>
+            </a:r>
+          </a:p>
+          <a:p>
+            <a:endParaRPr lang="en-US" dirty="0"/>
+          </a:p>
+          <a:p>
+            <a:r>
+              <a:rPr lang="en-US" b="1" i="1" dirty="0"/>
+              <a:t>Multi-Hand Support: </a:t>
+            </a:r>
+            <a:r>
+              <a:rPr lang="en-US" dirty="0"/>
+              <a:t>Implementing dual hand tracking enables recognition and tracking of gestures from both hands simultaneously, allowing for more complex interactions and commands, thus expanding the system's capabilities.</a:t>
+            </a:r>
+          </a:p>
+          <a:p>
+            <a:endParaRPr lang="en-US" dirty="0"/>
+          </a:p>
+          <a:p>
+            <a:r>
+              <a:rPr lang="en-US" b="1" i="1" dirty="0"/>
+              <a:t>Integration with More Applications</a:t>
+            </a:r>
+            <a:r>
+              <a:rPr lang="en-US" dirty="0"/>
+              <a:t>: Extending functionality to control various applications beyond PowerPoint, coupled with API development for easy integration, opens up opportunities for broader usage scenarios, such as media players, browsers, and gaming interfaces, enhancing the system's versatility and usability.</a:t>
+            </a:r>
+            <a:endParaRPr lang="en-IN" dirty="0"/>
+          </a:p>
+        </p:txBody>
+      </p:sp>
+    </p:spTree>
+    <p:extLst>
+      <p:ext uri="{BB962C8B-B14F-4D97-AF65-F5344CB8AC3E}">
+        <p14:creationId xmlns:p14="http://schemas.microsoft.com/office/powerpoint/2010/main" val="3874837427"/>
+      </p:ext>
+    </p:extLst>
+  </p:cSld>
+  <p:clrMapOvr>
+    <a:masterClrMapping/>
+  </p:clrMapOvr>
+  <mc:AlternateContent xmlns:mc="http://schemas.openxmlformats.org/markup-compatibility/2006" xmlns:p15="http://schemas.microsoft.com/office/powerpoint/2012/main">
+    <mc:Choice Requires="p15">
+      <p:transition xmlns:p14="http://schemas.microsoft.com/office/powerpoint/2010/main" spd="slow" p14:dur="1250">
+        <p15:prstTrans prst="pageCurlDouble"/>
+      </p:transition>
+    </mc:Choice>
+    <mc:Fallback xmlns="">
+      <p:transition spd="slow">
+        <p:fade/>
+      </p:transition>
+    </mc:Fallback>
+  </mc:AlternateContent>
+</p:sld>
+</file>
+
+<file path=ppt/slides/slide16.xml><?xml version="1.0" encoding="utf-8"?>
 <p:sld xmlns:a="http://schemas.openxmlformats.org/drawingml/2006/main" xmlns:r="http://schemas.openxmlformats.org/officeDocument/2006/relationships" xmlns:p="http://schemas.openxmlformats.org/presentationml/2006/main">
   <p:cSld>
     <p:spTree>
@@ -7923,7 +8621,7 @@
                 <a:latin typeface="Times New Roman" pitchFamily="18" charset="0"/>
                 <a:cs typeface="Times New Roman" pitchFamily="18" charset="0"/>
               </a:rPr>
-              <a:t>Usage</a:t>
+              <a:t>Objectives</a:t>
             </a:r>
           </a:p>
           <a:p>
@@ -7942,7 +8640,7 @@
                 <a:latin typeface="Times New Roman" pitchFamily="18" charset="0"/>
                 <a:cs typeface="Times New Roman" pitchFamily="18" charset="0"/>
               </a:rPr>
-              <a:t>Modules</a:t>
+              <a:t>Why?</a:t>
             </a:r>
           </a:p>
           <a:p>
@@ -7961,7 +8659,7 @@
                 <a:latin typeface="Times New Roman" pitchFamily="18" charset="0"/>
                 <a:cs typeface="Times New Roman" pitchFamily="18" charset="0"/>
               </a:rPr>
-              <a:t>Workflow</a:t>
+              <a:t>Technologies Used</a:t>
             </a:r>
           </a:p>
           <a:p>
@@ -7984,7 +8682,7 @@
                 <a:latin typeface="Times New Roman" pitchFamily="18" charset="0"/>
                 <a:cs typeface="Times New Roman" pitchFamily="18" charset="0"/>
               </a:rPr>
-              <a:t>Classification Algorithm</a:t>
+              <a:t>Workflow</a:t>
             </a:r>
           </a:p>
           <a:p>
@@ -8007,7 +8705,7 @@
                 <a:latin typeface="Times New Roman" pitchFamily="18" charset="0"/>
                 <a:cs typeface="Times New Roman" pitchFamily="18" charset="0"/>
               </a:rPr>
-              <a:t>Classifier Models</a:t>
+              <a:t>Applications</a:t>
             </a:r>
           </a:p>
           <a:p>
@@ -8030,7 +8728,7 @@
                 <a:latin typeface="Times New Roman" pitchFamily="18" charset="0"/>
                 <a:cs typeface="Times New Roman" pitchFamily="18" charset="0"/>
               </a:rPr>
-              <a:t>Final Output</a:t>
+              <a:t>Challenges</a:t>
             </a:r>
           </a:p>
           <a:p>
@@ -8124,7 +8822,7 @@
         </p:nvSpPr>
         <p:spPr>
           <a:xfrm>
-            <a:off x="308427" y="500231"/>
+            <a:off x="200272" y="248405"/>
             <a:ext cx="10802469" cy="1508105"/>
           </a:xfrm>
           <a:prstGeom prst="rect">
@@ -8189,10 +8887,10 @@
       </p:sp>
       <p:sp>
         <p:nvSpPr>
-          <p:cNvPr id="3" name="TextBox 2">
+          <p:cNvPr id="6" name="TextBox 5">
             <a:extLst>
               <a:ext uri="{FF2B5EF4-FFF2-40B4-BE49-F238E27FC236}">
-                <a16:creationId xmlns:a16="http://schemas.microsoft.com/office/drawing/2014/main" id="{19FD2CF6-679C-4FD7-92B4-975C86E33A08}"/>
+                <a16:creationId xmlns:a16="http://schemas.microsoft.com/office/drawing/2014/main" id="{2C5C0AED-484C-70D1-BDBB-75C122CB3236}"/>
               </a:ext>
             </a:extLst>
           </p:cNvPr>
@@ -8201,8 +8899,8 @@
         </p:nvSpPr>
         <p:spPr>
           <a:xfrm>
-            <a:off x="781380" y="1709977"/>
-            <a:ext cx="9324318" cy="4524315"/>
+            <a:off x="705041" y="1120444"/>
+            <a:ext cx="9635613" cy="5355312"/>
           </a:xfrm>
           <a:prstGeom prst="rect">
             <a:avLst/>
@@ -8215,99 +8913,118 @@
           </a:bodyPr>
           <a:lstStyle/>
           <a:p>
-            <a:pPr algn="just">
-              <a:buFont typeface="Wingdings" pitchFamily="2" charset="2"/>
-              <a:buChar char="Ø"/>
+            <a:r>
+              <a:rPr lang="en-US" b="1" i="1" dirty="0"/>
+              <a:t>What is Gesture Control?</a:t>
+            </a:r>
+          </a:p>
+          <a:p>
+            <a:endParaRPr lang="en-US" dirty="0"/>
+          </a:p>
+          <a:p>
+            <a:r>
+              <a:rPr lang="en-US" dirty="0"/>
+              <a:t>Gesture control refers to using hand and body movements to interact with digital devices without physically touching them.</a:t>
+            </a:r>
+          </a:p>
+          <a:p>
+            <a:endParaRPr lang="en-US" dirty="0"/>
+          </a:p>
+          <a:p>
+            <a:r>
+              <a:rPr lang="en-US" b="1" i="1" dirty="0"/>
+              <a:t>Why is it Important?</a:t>
+            </a:r>
+          </a:p>
+          <a:p>
+            <a:endParaRPr lang="en-US" dirty="0"/>
+          </a:p>
+          <a:p>
+            <a:pPr marL="285750" indent="-285750">
+              <a:buFont typeface="Arial" panose="020B0604020202020204" pitchFamily="34" charset="0"/>
+              <a:buChar char="•"/>
             </a:pPr>
             <a:r>
-              <a:rPr lang="en-US" sz="2400" b="1" i="0" dirty="0">
-                <a:solidFill>
-                  <a:schemeClr val="bg1"/>
-                </a:solidFill>
-                <a:effectLst/>
-                <a:latin typeface="Söhne"/>
-              </a:rPr>
-              <a:t> </a:t>
-            </a:r>
-            <a:r>
-              <a:rPr lang="en-US" sz="2400" b="1" i="0" dirty="0">
-                <a:effectLst/>
-                <a:latin typeface="Söhne"/>
-              </a:rPr>
-              <a:t>Hand Gesture Recognition </a:t>
-            </a:r>
-            <a:r>
-              <a:rPr lang="en-US" sz="2400" b="0" i="0" dirty="0">
-                <a:solidFill>
-                  <a:srgbClr val="D1D5DB"/>
-                </a:solidFill>
-                <a:effectLst/>
-                <a:latin typeface="Söhne"/>
-              </a:rPr>
-              <a:t>is a technology that enables computers to interpret and understand human hand movements and gestures. This involves capturing, processing, and interpreting hand movements through various computer vision techniques(like webcam). The goal is to enable a seamless interaction between humans and machines without the need for physical devices like a keyboard or mouse.</a:t>
-            </a:r>
-          </a:p>
-          <a:p>
-            <a:pPr algn="just"/>
-            <a:endParaRPr lang="en-IN" sz="2400" b="0" i="0" dirty="0">
-              <a:solidFill>
-                <a:schemeClr val="bg1"/>
-              </a:solidFill>
-              <a:effectLst/>
-              <a:latin typeface="Times New Roman" pitchFamily="18" charset="0"/>
-              <a:cs typeface="Times New Roman" pitchFamily="18" charset="0"/>
-            </a:endParaRPr>
-          </a:p>
-          <a:p>
-            <a:pPr algn="just">
-              <a:buFont typeface="Wingdings" pitchFamily="2" charset="2"/>
-              <a:buChar char="Ø"/>
+              <a:rPr lang="en-US" dirty="0"/>
+              <a:t>Enhances user experience by providing a more natural and intuitive way to control devices.</a:t>
+            </a:r>
+          </a:p>
+          <a:p>
+            <a:pPr marL="285750" indent="-285750">
+              <a:buFont typeface="Arial" panose="020B0604020202020204" pitchFamily="34" charset="0"/>
+              <a:buChar char="•"/>
             </a:pPr>
             <a:r>
-              <a:rPr lang="en-US" sz="2400" dirty="0">
-                <a:solidFill>
-                  <a:schemeClr val="bg1"/>
-                </a:solidFill>
-                <a:latin typeface="Times New Roman" pitchFamily="18" charset="0"/>
-                <a:cs typeface="Times New Roman" pitchFamily="18" charset="0"/>
-              </a:rPr>
-              <a:t> </a:t>
-            </a:r>
-            <a:r>
-              <a:rPr lang="en-US" sz="2400" dirty="0">
-                <a:solidFill>
-                  <a:schemeClr val="tx1">
-                    <a:lumMod val="85000"/>
-                  </a:schemeClr>
-                </a:solidFill>
-                <a:latin typeface="Times New Roman" pitchFamily="18" charset="0"/>
-                <a:cs typeface="Times New Roman" pitchFamily="18" charset="0"/>
-              </a:rPr>
-              <a:t>The concept of interpreting hand movements to convey commands or input has garnered significant attention, finding applications in diverse fields such as gaming, virtual reality, and assistive technologies</a:t>
-            </a:r>
-          </a:p>
-          <a:p>
-            <a:pPr algn="just">
-              <a:buFont typeface="Wingdings" pitchFamily="2" charset="2"/>
-              <a:buChar char="Ø"/>
+              <a:rPr lang="en-US" dirty="0"/>
+              <a:t>Useful in various fields like gaming, presentations, robotics, and accessibility for individuals with disabilities.</a:t>
+            </a:r>
+          </a:p>
+          <a:p>
+            <a:pPr marL="285750" indent="-285750">
+              <a:buFont typeface="Arial" panose="020B0604020202020204" pitchFamily="34" charset="0"/>
+              <a:buChar char="•"/>
             </a:pPr>
-            <a:endParaRPr lang="en-US" sz="2400" dirty="0">
-              <a:solidFill>
-                <a:schemeClr val="bg1"/>
-              </a:solidFill>
-              <a:latin typeface="Times New Roman" pitchFamily="18" charset="0"/>
-              <a:cs typeface="Times New Roman" pitchFamily="18" charset="0"/>
-            </a:endParaRPr>
-          </a:p>
-          <a:p>
-            <a:pPr algn="just"/>
-            <a:endParaRPr lang="en-IN" sz="2400" b="1" dirty="0">
-              <a:solidFill>
-                <a:schemeClr val="bg1"/>
-              </a:solidFill>
-              <a:latin typeface="Times New Roman" pitchFamily="18" charset="0"/>
-              <a:cs typeface="Times New Roman" pitchFamily="18" charset="0"/>
-            </a:endParaRPr>
+            <a:endParaRPr lang="en-US" dirty="0"/>
+          </a:p>
+          <a:p>
+            <a:r>
+              <a:rPr lang="en-US" b="1" i="1" dirty="0"/>
+              <a:t>About the Project:</a:t>
+            </a:r>
+          </a:p>
+          <a:p>
+            <a:endParaRPr lang="en-US" dirty="0"/>
+          </a:p>
+          <a:p>
+            <a:pPr marL="285750" indent="-285750">
+              <a:buFont typeface="Arial" panose="020B0604020202020204" pitchFamily="34" charset="0"/>
+              <a:buChar char="•"/>
+            </a:pPr>
+            <a:r>
+              <a:rPr lang="en-US" dirty="0"/>
+              <a:t>Our project is a Gesture Control System.</a:t>
+            </a:r>
+          </a:p>
+          <a:p>
+            <a:pPr marL="285750" indent="-285750">
+              <a:buFont typeface="Arial" panose="020B0604020202020204" pitchFamily="34" charset="0"/>
+              <a:buChar char="•"/>
+            </a:pPr>
+            <a:r>
+              <a:rPr lang="en-US" dirty="0"/>
+              <a:t>It uses a webcam to track hand movements.</a:t>
+            </a:r>
+          </a:p>
+          <a:p>
+            <a:pPr marL="285750" indent="-285750">
+              <a:buFont typeface="Arial" panose="020B0604020202020204" pitchFamily="34" charset="0"/>
+              <a:buChar char="•"/>
+            </a:pPr>
+            <a:r>
+              <a:rPr lang="en-US" dirty="0"/>
+              <a:t>The system recognizes specific gestures to control computer applications.</a:t>
+            </a:r>
+          </a:p>
+          <a:p>
+            <a:pPr marL="285750" indent="-285750">
+              <a:buFont typeface="Arial" panose="020B0604020202020204" pitchFamily="34" charset="0"/>
+              <a:buChar char="•"/>
+            </a:pPr>
+            <a:r>
+              <a:rPr lang="en-US" dirty="0"/>
+              <a:t>We integrated it with PowerPoint for controlling presentations using hand gestures.</a:t>
+            </a:r>
+          </a:p>
+          <a:p>
+            <a:pPr marL="285750" indent="-285750">
+              <a:buFont typeface="Arial" panose="020B0604020202020204" pitchFamily="34" charset="0"/>
+              <a:buChar char="•"/>
+            </a:pPr>
+            <a:r>
+              <a:rPr lang="en-US" dirty="0"/>
+              <a:t>Our project uses Python and its libraries.</a:t>
+            </a:r>
+            <a:endParaRPr lang="en-IN" dirty="0"/>
           </a:p>
         </p:txBody>
       </p:sp>
@@ -8367,7 +9084,7 @@
         </p:nvSpPr>
         <p:spPr>
           <a:xfrm>
-            <a:off x="652462" y="803196"/>
+            <a:off x="622965" y="311583"/>
             <a:ext cx="3882669" cy="646331"/>
           </a:xfrm>
           <a:prstGeom prst="rect">
@@ -8391,17 +9108,17 @@
                 <a:latin typeface="Times New Roman" pitchFamily="18" charset="0"/>
                 <a:cs typeface="Times New Roman" pitchFamily="18" charset="0"/>
               </a:rPr>
-              <a:t>Usage</a:t>
-            </a:r>
-          </a:p>
-        </p:txBody>
-      </p:sp>
-      <p:sp>
-        <p:nvSpPr>
-          <p:cNvPr id="4" name="TextBox 3">
+              <a:t>Objectives:</a:t>
+            </a:r>
+          </a:p>
+        </p:txBody>
+      </p:sp>
+      <p:sp>
+        <p:nvSpPr>
+          <p:cNvPr id="3" name="TextBox 2">
             <a:extLst>
               <a:ext uri="{FF2B5EF4-FFF2-40B4-BE49-F238E27FC236}">
-                <a16:creationId xmlns:a16="http://schemas.microsoft.com/office/drawing/2014/main" id="{895185F4-171D-497B-AE4C-3DE5A9FAD2F9}"/>
+                <a16:creationId xmlns:a16="http://schemas.microsoft.com/office/drawing/2014/main" id="{CFCB9828-7C52-D271-3AB6-92319AE4CE43}"/>
               </a:ext>
             </a:extLst>
           </p:cNvPr>
@@ -8410,8 +9127,8 @@
         </p:nvSpPr>
         <p:spPr>
           <a:xfrm>
-            <a:off x="353014" y="1899820"/>
-            <a:ext cx="11103865" cy="4154984"/>
+            <a:off x="622965" y="1297858"/>
+            <a:ext cx="10028902" cy="4801314"/>
           </a:xfrm>
           <a:prstGeom prst="rect">
             <a:avLst/>
@@ -8424,143 +9141,74 @@
           </a:bodyPr>
           <a:lstStyle/>
           <a:p>
-            <a:pPr algn="just">
-              <a:buFont typeface="Wingdings" pitchFamily="2" charset="2"/>
-              <a:buChar char="Ø"/>
-            </a:pPr>
-            <a:r>
-              <a:rPr lang="en-US" sz="2400" b="1" i="0" dirty="0">
-                <a:solidFill>
-                  <a:schemeClr val="bg1"/>
-                </a:solidFill>
-                <a:effectLst/>
-                <a:latin typeface="Söhne"/>
-              </a:rPr>
-              <a:t> </a:t>
-            </a:r>
-            <a:r>
-              <a:rPr lang="en-US" sz="2400" b="1" i="0" dirty="0">
-                <a:effectLst/>
-                <a:latin typeface="Söhne"/>
-              </a:rPr>
-              <a:t>Human-Computer Interaction (HCI): </a:t>
-            </a:r>
-            <a:r>
-              <a:rPr lang="en-US" sz="2400" b="0" i="0" dirty="0">
-                <a:solidFill>
-                  <a:srgbClr val="D1D5DB"/>
-                </a:solidFill>
-                <a:effectLst/>
-                <a:latin typeface="Söhne"/>
-              </a:rPr>
-              <a:t>The ability to recognize hand gestures in real-time facilitates a natural and intuitive interaction between humans and computers. This can be particularly useful in applications where traditional input devices like keyboards and mice are impractical, such as virtual reality environments or touchless interfaces.</a:t>
-            </a:r>
-            <a:endParaRPr lang="en-IN" sz="2400" dirty="0">
-              <a:solidFill>
-                <a:schemeClr val="bg1"/>
-              </a:solidFill>
-              <a:latin typeface="Times New Roman" pitchFamily="18" charset="0"/>
-              <a:cs typeface="Times New Roman" pitchFamily="18" charset="0"/>
-            </a:endParaRPr>
-          </a:p>
-          <a:p>
-            <a:pPr algn="just"/>
-            <a:endParaRPr lang="en-US" sz="2400" dirty="0">
-              <a:solidFill>
-                <a:schemeClr val="bg1"/>
-              </a:solidFill>
-              <a:latin typeface="Times New Roman" pitchFamily="18" charset="0"/>
-              <a:cs typeface="Times New Roman" pitchFamily="18" charset="0"/>
-            </a:endParaRPr>
-          </a:p>
-          <a:p>
-            <a:pPr algn="just">
-              <a:buFont typeface="Wingdings" pitchFamily="2" charset="2"/>
-              <a:buChar char="Ø"/>
-            </a:pPr>
-            <a:r>
-              <a:rPr lang="en-IN" sz="2400" dirty="0">
-                <a:solidFill>
-                  <a:schemeClr val="bg1"/>
-                </a:solidFill>
-                <a:latin typeface="Times New Roman" pitchFamily="18" charset="0"/>
-                <a:cs typeface="Times New Roman" pitchFamily="18" charset="0"/>
-              </a:rPr>
-              <a:t> </a:t>
-            </a:r>
-            <a:r>
-              <a:rPr lang="en-US" sz="2400" b="1" i="0" dirty="0">
-                <a:effectLst/>
-                <a:latin typeface="Söhne"/>
-              </a:rPr>
-              <a:t>Accessibility:</a:t>
-            </a:r>
-            <a:r>
-              <a:rPr lang="en-US" sz="2400" b="0" i="0" dirty="0">
-                <a:solidFill>
-                  <a:srgbClr val="D1D5DB"/>
-                </a:solidFill>
-                <a:effectLst/>
-                <a:latin typeface="Söhne"/>
-              </a:rPr>
-              <a:t> Hand gesture recognition can enhance accessibility for individuals with disabilities. People with limited mobility or certain impairments may find it easier to control and interact with devices through hand gestures, providing an alternative to traditional input methods.</a:t>
-            </a:r>
-            <a:endParaRPr lang="en-US" sz="2400" dirty="0">
-              <a:solidFill>
-                <a:schemeClr val="bg1"/>
-              </a:solidFill>
-              <a:latin typeface="Times New Roman" pitchFamily="18" charset="0"/>
-              <a:cs typeface="Times New Roman" pitchFamily="18" charset="0"/>
-            </a:endParaRPr>
-          </a:p>
-          <a:p>
-            <a:endParaRPr lang="en-US" sz="2400" dirty="0">
-              <a:solidFill>
-                <a:schemeClr val="bg1"/>
-              </a:solidFill>
-              <a:latin typeface="Times New Roman" pitchFamily="18" charset="0"/>
-              <a:cs typeface="Times New Roman" pitchFamily="18" charset="0"/>
-            </a:endParaRPr>
-          </a:p>
-          <a:p>
-            <a:endParaRPr lang="en-US" sz="2400" b="1" dirty="0">
-              <a:solidFill>
-                <a:schemeClr val="bg1"/>
-              </a:solidFill>
-            </a:endParaRPr>
-          </a:p>
-        </p:txBody>
-      </p:sp>
-      <p:sp>
-        <p:nvSpPr>
-          <p:cNvPr id="5" name="Rectangle 4"/>
-          <p:cNvSpPr/>
-          <p:nvPr/>
-        </p:nvSpPr>
-        <p:spPr>
-          <a:xfrm>
-            <a:off x="8594245" y="-243533"/>
-            <a:ext cx="394660" cy="461665"/>
-          </a:xfrm>
-          <a:prstGeom prst="rect">
-            <a:avLst/>
-          </a:prstGeom>
-        </p:spPr>
-        <p:txBody>
-          <a:bodyPr wrap="none">
-            <a:spAutoFit/>
-          </a:bodyPr>
-          <a:lstStyle/>
-          <a:p>
-            <a:r>
-              <a:rPr lang="en-IN" sz="2400" dirty="0">
-                <a:solidFill>
-                  <a:prstClr val="black"/>
-                </a:solidFill>
-              </a:rPr>
-              <a:t>p</a:t>
-            </a:r>
-            <a:endParaRPr lang="en-US" dirty="0"/>
+            <a:r>
+              <a:rPr lang="en-US" b="1" i="1" dirty="0"/>
+              <a:t>1. Develop a Gesture Control System:</a:t>
+            </a:r>
+          </a:p>
+          <a:p>
+            <a:endParaRPr lang="en-US" dirty="0"/>
+          </a:p>
+          <a:p>
+            <a:r>
+              <a:rPr lang="en-US" dirty="0"/>
+              <a:t>Create a system that can recognize and interpret hand gestures.</a:t>
+            </a:r>
+          </a:p>
+          <a:p>
+            <a:endParaRPr lang="en-US" dirty="0"/>
+          </a:p>
+          <a:p>
+            <a:r>
+              <a:rPr lang="en-US" b="1" i="1" dirty="0"/>
+              <a:t>2. Implement Hand Tracking and Gesture Recognition:</a:t>
+            </a:r>
+          </a:p>
+          <a:p>
+            <a:endParaRPr lang="en-US" dirty="0"/>
+          </a:p>
+          <a:p>
+            <a:r>
+              <a:rPr lang="en-US" dirty="0"/>
+              <a:t>Detect hand positions and movements to recognize specific gestures.</a:t>
+            </a:r>
+          </a:p>
+          <a:p>
+            <a:endParaRPr lang="en-US" dirty="0"/>
+          </a:p>
+          <a:p>
+            <a:r>
+              <a:rPr lang="en-US" b="1" i="1" dirty="0"/>
+              <a:t>3. Control Computer Applications:</a:t>
+            </a:r>
+          </a:p>
+          <a:p>
+            <a:endParaRPr lang="en-US" dirty="0"/>
+          </a:p>
+          <a:p>
+            <a:r>
+              <a:rPr lang="en-US" dirty="0"/>
+              <a:t>Use recognized gestures to control various computer functions (like moving the cursor, clicking, scrolling).</a:t>
+            </a:r>
+          </a:p>
+          <a:p>
+            <a:endParaRPr lang="en-US" dirty="0"/>
+          </a:p>
+          <a:p>
+            <a:r>
+              <a:rPr lang="en-US" b="1" i="1" dirty="0"/>
+              <a:t>4. Integrate with Presentation Software:</a:t>
+            </a:r>
+          </a:p>
+          <a:p>
+            <a:endParaRPr lang="en-US" dirty="0"/>
+          </a:p>
+          <a:p>
+            <a:r>
+              <a:rPr lang="en-US" dirty="0"/>
+              <a:t>Enable control of PowerPoint presentations through hand gestures for easier and more interactive presentations.</a:t>
+            </a:r>
+            <a:endParaRPr lang="en-IN" dirty="0"/>
           </a:p>
         </p:txBody>
       </p:sp>
@@ -8603,147 +9251,44 @@
       </p:grpSpPr>
       <p:sp>
         <p:nvSpPr>
-          <p:cNvPr id="2" name="Rectangle 1"/>
-          <p:cNvSpPr/>
+          <p:cNvPr id="3" name="TextBox 2">
+            <a:extLst>
+              <a:ext uri="{FF2B5EF4-FFF2-40B4-BE49-F238E27FC236}">
+                <a16:creationId xmlns:a16="http://schemas.microsoft.com/office/drawing/2014/main" id="{3F4BB005-65C9-9654-7C2E-A4A69DD90DC6}"/>
+              </a:ext>
+            </a:extLst>
+          </p:cNvPr>
+          <p:cNvSpPr txBox="1"/>
           <p:nvPr/>
         </p:nvSpPr>
         <p:spPr>
           <a:xfrm>
-            <a:off x="806837" y="1111270"/>
-            <a:ext cx="10553700" cy="4893647"/>
+            <a:off x="200272" y="189845"/>
+            <a:ext cx="8373457" cy="1508105"/>
           </a:xfrm>
           <a:prstGeom prst="rect">
             <a:avLst/>
           </a:prstGeom>
+          <a:noFill/>
         </p:spPr>
         <p:txBody>
-          <a:bodyPr wrap="square">
+          <a:bodyPr wrap="square" rtlCol="0">
             <a:spAutoFit/>
           </a:bodyPr>
           <a:lstStyle/>
           <a:p>
-            <a:pPr algn="just">
-              <a:buFont typeface="Wingdings" pitchFamily="2" charset="2"/>
-              <a:buChar char="Ø"/>
-            </a:pPr>
-            <a:r>
-              <a:rPr lang="en-IN" sz="2000" dirty="0">
+            <a:r>
+              <a:rPr lang="en-IN" sz="3200" b="1" dirty="0">
                 <a:solidFill>
-                  <a:schemeClr val="bg1"/>
+                  <a:srgbClr val="7030A0"/>
                 </a:solidFill>
                 <a:latin typeface="Times New Roman" pitchFamily="18" charset="0"/>
                 <a:cs typeface="Times New Roman" pitchFamily="18" charset="0"/>
               </a:rPr>
-              <a:t> </a:t>
-            </a:r>
-            <a:r>
-              <a:rPr lang="en-US" sz="2400" b="1" i="0" dirty="0">
-                <a:effectLst/>
-                <a:latin typeface="Söhne"/>
-              </a:rPr>
-              <a:t>Educational Tools:</a:t>
-            </a:r>
-            <a:r>
-              <a:rPr lang="en-US" sz="2400" b="0" i="0" dirty="0">
-                <a:solidFill>
-                  <a:srgbClr val="D1D5DB"/>
-                </a:solidFill>
-                <a:effectLst/>
-                <a:latin typeface="Söhne"/>
-              </a:rPr>
-              <a:t> The project can serve as an educational tool for learning about computer vision, deep learning, and real-time processing. Students and developers can use it as a starting point to understand how to implement gesture recognition systems and customize them for specific use cases.</a:t>
-            </a:r>
-          </a:p>
-          <a:p>
-            <a:pPr algn="just"/>
-            <a:endParaRPr lang="en-US" sz="2400" dirty="0">
-              <a:solidFill>
-                <a:schemeClr val="bg1"/>
-              </a:solidFill>
-              <a:latin typeface="Times New Roman" pitchFamily="18" charset="0"/>
-              <a:cs typeface="Times New Roman" pitchFamily="18" charset="0"/>
-            </a:endParaRPr>
-          </a:p>
-          <a:p>
-            <a:pPr algn="just">
-              <a:buFont typeface="Wingdings" pitchFamily="2" charset="2"/>
-              <a:buChar char="Ø"/>
-            </a:pPr>
-            <a:r>
-              <a:rPr lang="en-IN" sz="2400" dirty="0">
-                <a:solidFill>
-                  <a:schemeClr val="bg1"/>
-                </a:solidFill>
-                <a:latin typeface="Times New Roman" pitchFamily="18" charset="0"/>
-                <a:cs typeface="Times New Roman" pitchFamily="18" charset="0"/>
-              </a:rPr>
-              <a:t> </a:t>
-            </a:r>
-            <a:r>
-              <a:rPr lang="en-US" sz="2400" b="1" i="0" dirty="0">
-                <a:effectLst/>
-                <a:latin typeface="Söhne"/>
-              </a:rPr>
-              <a:t>Training and Simulation:</a:t>
-            </a:r>
-            <a:r>
-              <a:rPr lang="en-US" sz="2400" b="0" i="0" dirty="0">
-                <a:solidFill>
-                  <a:srgbClr val="D1D5DB"/>
-                </a:solidFill>
-                <a:effectLst/>
-                <a:latin typeface="Söhne"/>
-              </a:rPr>
-              <a:t> Gesture recognition can be used in training simulations for various fields, such as aviation or military training. Users can interact with simulated environments using hand gestures, providing a more realistic training experience.</a:t>
-            </a:r>
-          </a:p>
-          <a:p>
-            <a:pPr algn="just">
-              <a:buFont typeface="Wingdings" pitchFamily="2" charset="2"/>
-              <a:buChar char="Ø"/>
-            </a:pPr>
-            <a:endParaRPr lang="en-US" sz="2400" dirty="0">
-              <a:solidFill>
-                <a:srgbClr val="D1D5DB"/>
-              </a:solidFill>
-              <a:latin typeface="Söhne"/>
-              <a:cs typeface="Times New Roman" pitchFamily="18" charset="0"/>
-            </a:endParaRPr>
-          </a:p>
-          <a:p>
-            <a:pPr algn="just">
-              <a:buFont typeface="Wingdings" pitchFamily="2" charset="2"/>
-              <a:buChar char="Ø"/>
-            </a:pPr>
-            <a:r>
-              <a:rPr lang="en-US" sz="2400" dirty="0">
-                <a:solidFill>
-                  <a:schemeClr val="bg1"/>
-                </a:solidFill>
-                <a:latin typeface="Times New Roman" pitchFamily="18" charset="0"/>
-                <a:cs typeface="Times New Roman" pitchFamily="18" charset="0"/>
-              </a:rPr>
-              <a:t> </a:t>
-            </a:r>
-            <a:r>
-              <a:rPr lang="en-US" sz="2400" b="1" dirty="0">
-                <a:latin typeface="Times New Roman" pitchFamily="18" charset="0"/>
-                <a:cs typeface="Times New Roman" pitchFamily="18" charset="0"/>
-              </a:rPr>
-              <a:t>Entertainment and Gaming</a:t>
-            </a:r>
-            <a:r>
-              <a:rPr lang="en-US" sz="2400" dirty="0">
-                <a:solidFill>
-                  <a:schemeClr val="bg1"/>
-                </a:solidFill>
-                <a:latin typeface="Times New Roman" pitchFamily="18" charset="0"/>
-                <a:cs typeface="Times New Roman" pitchFamily="18" charset="0"/>
-              </a:rPr>
-              <a:t>: </a:t>
-            </a:r>
-            <a:r>
-              <a:rPr lang="en-US" sz="2400" dirty="0">
+              <a:t>     </a:t>
+            </a:r>
+            <a:r>
+              <a:rPr lang="en-IN" sz="3600" b="1" u="sng" dirty="0">
                 <a:solidFill>
                   <a:schemeClr val="tx1">
                     <a:lumMod val="85000"/>
@@ -8752,9 +9297,9 @@
                 <a:latin typeface="Times New Roman" pitchFamily="18" charset="0"/>
                 <a:cs typeface="Times New Roman" pitchFamily="18" charset="0"/>
               </a:rPr>
-              <a:t>Gesture recognition can be integrated into gaming consoles and entertainment systems, offering an immersive and interactive experience for users.</a:t>
-            </a:r>
-            <a:endParaRPr lang="en-US" dirty="0">
+              <a:t>Why?</a:t>
+            </a:r>
+            <a:endParaRPr lang="en-IN" sz="3200" b="1" u="sng" dirty="0">
               <a:solidFill>
                 <a:schemeClr val="tx1">
                   <a:lumMod val="85000"/>
@@ -8763,6 +9308,171 @@
               <a:latin typeface="Times New Roman" pitchFamily="18" charset="0"/>
               <a:cs typeface="Times New Roman" pitchFamily="18" charset="0"/>
             </a:endParaRPr>
+          </a:p>
+          <a:p>
+            <a:endParaRPr lang="en-IN" sz="3200" b="1" dirty="0">
+              <a:latin typeface="Times New Roman" pitchFamily="18" charset="0"/>
+              <a:cs typeface="Times New Roman" pitchFamily="18" charset="0"/>
+            </a:endParaRPr>
+          </a:p>
+          <a:p>
+            <a:endParaRPr lang="en-IN" sz="2400" dirty="0">
+              <a:latin typeface="Times New Roman" pitchFamily="18" charset="0"/>
+              <a:cs typeface="Times New Roman" pitchFamily="18" charset="0"/>
+            </a:endParaRPr>
+          </a:p>
+        </p:txBody>
+      </p:sp>
+      <p:sp>
+        <p:nvSpPr>
+          <p:cNvPr id="4" name="TextBox 3">
+            <a:extLst>
+              <a:ext uri="{FF2B5EF4-FFF2-40B4-BE49-F238E27FC236}">
+                <a16:creationId xmlns:a16="http://schemas.microsoft.com/office/drawing/2014/main" id="{43E79ED9-2DC1-6C4A-5E2E-84AFE31BF64A}"/>
+              </a:ext>
+            </a:extLst>
+          </p:cNvPr>
+          <p:cNvSpPr txBox="1"/>
+          <p:nvPr/>
+        </p:nvSpPr>
+        <p:spPr>
+          <a:xfrm>
+            <a:off x="678425" y="1061885"/>
+            <a:ext cx="9753600" cy="5690872"/>
+          </a:xfrm>
+          <a:prstGeom prst="rect">
+            <a:avLst/>
+          </a:prstGeom>
+          <a:noFill/>
+        </p:spPr>
+        <p:txBody>
+          <a:bodyPr wrap="square" rtlCol="0">
+            <a:spAutoFit/>
+          </a:bodyPr>
+          <a:lstStyle/>
+          <a:p>
+            <a:r>
+              <a:rPr lang="en-US" b="1" i="1" dirty="0"/>
+              <a:t>1. Accessibility:</a:t>
+            </a:r>
+          </a:p>
+          <a:p>
+            <a:endParaRPr lang="en-US" dirty="0"/>
+          </a:p>
+          <a:p>
+            <a:pPr marL="285750" indent="-285750">
+              <a:buFont typeface="Arial" panose="020B0604020202020204" pitchFamily="34" charset="0"/>
+              <a:buChar char="•"/>
+            </a:pPr>
+            <a:r>
+              <a:rPr lang="en-US" i="1" dirty="0"/>
+              <a:t>Arthritis</a:t>
+            </a:r>
+            <a:r>
+              <a:rPr lang="en-US" dirty="0"/>
+              <a:t>: Joint pain and stiffness can make gripping a mouse painful.</a:t>
+            </a:r>
+          </a:p>
+          <a:p>
+            <a:endParaRPr lang="en-US" dirty="0"/>
+          </a:p>
+          <a:p>
+            <a:pPr marL="285750" indent="-285750">
+              <a:buFont typeface="Arial" panose="020B0604020202020204" pitchFamily="34" charset="0"/>
+              <a:buChar char="•"/>
+            </a:pPr>
+            <a:r>
+              <a:rPr lang="en-US" i="1" dirty="0"/>
+              <a:t>Carpal Tunnel Syndrome</a:t>
+            </a:r>
+            <a:r>
+              <a:rPr lang="en-US" dirty="0"/>
+              <a:t>: Causes pain, numbness, and tingling in the hand and arm, making prolonged use of a mouse uncomfortable.</a:t>
+            </a:r>
+          </a:p>
+          <a:p>
+            <a:endParaRPr lang="en-US" dirty="0"/>
+          </a:p>
+          <a:p>
+            <a:pPr marL="285750" indent="-285750">
+              <a:buFont typeface="Arial" panose="020B0604020202020204" pitchFamily="34" charset="0"/>
+              <a:buChar char="•"/>
+            </a:pPr>
+            <a:r>
+              <a:rPr lang="en-US" i="1" dirty="0"/>
+              <a:t>General Mobility Issues</a:t>
+            </a:r>
+            <a:r>
+              <a:rPr lang="en-US" dirty="0"/>
+              <a:t>: Helps users who struggle with fine motor skills or have limited hand dexterity.</a:t>
+            </a:r>
+          </a:p>
+          <a:p>
+            <a:endParaRPr lang="en-US" dirty="0"/>
+          </a:p>
+          <a:p>
+            <a:r>
+              <a:rPr lang="en-US" b="1" i="1" dirty="0"/>
+              <a:t>2. Ease of Use:</a:t>
+            </a:r>
+          </a:p>
+          <a:p>
+            <a:endParaRPr lang="en-US" dirty="0"/>
+          </a:p>
+          <a:p>
+            <a:pPr marL="285750" indent="-285750">
+              <a:buFont typeface="Arial" panose="020B0604020202020204" pitchFamily="34" charset="0"/>
+              <a:buChar char="•"/>
+            </a:pPr>
+            <a:r>
+              <a:rPr lang="en-US" dirty="0"/>
+              <a:t>Intuitive and natural interaction.</a:t>
+            </a:r>
+          </a:p>
+          <a:p>
+            <a:pPr marL="285750" indent="-285750">
+              <a:buFont typeface="Arial" panose="020B0604020202020204" pitchFamily="34" charset="0"/>
+              <a:buChar char="•"/>
+            </a:pPr>
+            <a:r>
+              <a:rPr lang="en-US" dirty="0"/>
+              <a:t>Reduces strain on hands and wrists.</a:t>
+            </a:r>
+          </a:p>
+          <a:p>
+            <a:endParaRPr lang="en-US" dirty="0"/>
+          </a:p>
+          <a:p>
+            <a:r>
+              <a:rPr lang="en-US" b="1" i="1" dirty="0"/>
+              <a:t>3. Modern Interaction:</a:t>
+            </a:r>
+          </a:p>
+          <a:p>
+            <a:endParaRPr lang="en-US" dirty="0"/>
+          </a:p>
+          <a:p>
+            <a:pPr marL="285750" indent="-285750">
+              <a:buFont typeface="Arial" panose="020B0604020202020204" pitchFamily="34" charset="0"/>
+              <a:buChar char="•"/>
+            </a:pPr>
+            <a:r>
+              <a:rPr lang="en-US" dirty="0"/>
+              <a:t>Aligns with the trend towards touchless technology.</a:t>
+            </a:r>
+          </a:p>
+          <a:p>
+            <a:pPr marL="285750" indent="-285750">
+              <a:buFont typeface="Arial" panose="020B0604020202020204" pitchFamily="34" charset="0"/>
+              <a:buChar char="•"/>
+            </a:pPr>
+            <a:r>
+              <a:rPr lang="en-US" dirty="0"/>
+              <a:t>Provides a futuristic and innovative way to interact with computers.</a:t>
+            </a:r>
+          </a:p>
+          <a:p>
+            <a:endParaRPr lang="en-US" dirty="0"/>
           </a:p>
         </p:txBody>
       </p:sp>
@@ -8805,133 +9515,149 @@
       </p:grpSpPr>
       <p:sp>
         <p:nvSpPr>
-          <p:cNvPr id="2" name="Title 1">
+          <p:cNvPr id="5" name="TextBox 4">
             <a:extLst>
               <a:ext uri="{FF2B5EF4-FFF2-40B4-BE49-F238E27FC236}">
-                <a16:creationId xmlns:a16="http://schemas.microsoft.com/office/drawing/2014/main" id="{D2AF4656-21D5-F2C7-3C81-7923C2F2298A}"/>
+                <a16:creationId xmlns:a16="http://schemas.microsoft.com/office/drawing/2014/main" id="{BED3D346-27B6-5262-6013-7B2AB4CAFB6B}"/>
               </a:ext>
             </a:extLst>
           </p:cNvPr>
-          <p:cNvSpPr>
-            <a:spLocks noGrp="1"/>
-          </p:cNvSpPr>
-          <p:nvPr>
-            <p:ph type="title"/>
-          </p:nvPr>
+          <p:cNvSpPr txBox="1"/>
+          <p:nvPr/>
         </p:nvSpPr>
         <p:spPr>
           <a:xfrm>
-            <a:off x="646111" y="452718"/>
-            <a:ext cx="2500212" cy="786147"/>
-          </a:xfrm>
-        </p:spPr>
-        <p:txBody>
-          <a:bodyPr/>
-          <a:lstStyle/>
-          <a:p>
-            <a:r>
-              <a:rPr lang="en-IN" sz="3600" b="1" u="sng" dirty="0">
-                <a:latin typeface="Times New Roman" panose="02020603050405020304" pitchFamily="18" charset="0"/>
-                <a:cs typeface="Times New Roman" panose="02020603050405020304" pitchFamily="18" charset="0"/>
-              </a:rPr>
-              <a:t>Modules</a:t>
-            </a:r>
-          </a:p>
-        </p:txBody>
-      </p:sp>
-      <p:pic>
-        <p:nvPicPr>
-          <p:cNvPr id="14" name="Content Placeholder 13">
-            <a:extLst>
-              <a:ext uri="{FF2B5EF4-FFF2-40B4-BE49-F238E27FC236}">
-                <a16:creationId xmlns:a16="http://schemas.microsoft.com/office/drawing/2014/main" id="{FB41C14D-0213-84CD-0575-D7F5963818B2}"/>
-              </a:ext>
-            </a:extLst>
-          </p:cNvPr>
-          <p:cNvPicPr>
-            <a:picLocks noGrp="1" noChangeAspect="1"/>
-          </p:cNvPicPr>
-          <p:nvPr>
-            <p:ph idx="1"/>
-          </p:nvPr>
-        </p:nvPicPr>
-        <p:blipFill>
-          <a:blip r:embed="rId2"/>
-          <a:stretch>
-            <a:fillRect/>
-          </a:stretch>
-        </p:blipFill>
-        <p:spPr>
-          <a:xfrm>
-            <a:off x="969065" y="1378429"/>
-            <a:ext cx="3010368" cy="2583444"/>
-          </a:xfrm>
-        </p:spPr>
-      </p:pic>
-      <p:pic>
-        <p:nvPicPr>
-          <p:cNvPr id="16" name="Picture 15">
-            <a:extLst>
-              <a:ext uri="{FF2B5EF4-FFF2-40B4-BE49-F238E27FC236}">
-                <a16:creationId xmlns:a16="http://schemas.microsoft.com/office/drawing/2014/main" id="{BDD5301D-26F9-7D97-B38B-22FD66A96441}"/>
-              </a:ext>
-            </a:extLst>
-          </p:cNvPr>
-          <p:cNvPicPr>
-            <a:picLocks noChangeAspect="1"/>
-          </p:cNvPicPr>
-          <p:nvPr/>
-        </p:nvPicPr>
-        <p:blipFill>
-          <a:blip r:embed="rId3"/>
-          <a:stretch>
-            <a:fillRect/>
-          </a:stretch>
-        </p:blipFill>
-        <p:spPr>
-          <a:xfrm>
-            <a:off x="6262697" y="1426562"/>
-            <a:ext cx="2854440" cy="2634161"/>
+            <a:off x="550606" y="334298"/>
+            <a:ext cx="9822426" cy="5909310"/>
           </a:xfrm>
           <a:prstGeom prst="rect">
             <a:avLst/>
           </a:prstGeom>
+          <a:noFill/>
         </p:spPr>
-      </p:pic>
-      <p:pic>
-        <p:nvPicPr>
-          <p:cNvPr id="18" name="Picture 17">
-            <a:extLst>
-              <a:ext uri="{FF2B5EF4-FFF2-40B4-BE49-F238E27FC236}">
-                <a16:creationId xmlns:a16="http://schemas.microsoft.com/office/drawing/2014/main" id="{F7CCB507-22FB-4288-9751-26F2DCCDD479}"/>
-              </a:ext>
-            </a:extLst>
-          </p:cNvPr>
-          <p:cNvPicPr>
-            <a:picLocks noChangeAspect="1"/>
-          </p:cNvPicPr>
-          <p:nvPr/>
-        </p:nvPicPr>
-        <p:blipFill>
-          <a:blip r:embed="rId4"/>
-          <a:stretch>
-            <a:fillRect/>
-          </a:stretch>
-        </p:blipFill>
-        <p:spPr>
-          <a:xfrm>
-            <a:off x="2934358" y="4200287"/>
-            <a:ext cx="3623759" cy="2204995"/>
-          </a:xfrm>
-          <a:prstGeom prst="rect">
-            <a:avLst/>
-          </a:prstGeom>
-        </p:spPr>
-      </p:pic>
+        <p:txBody>
+          <a:bodyPr wrap="square" rtlCol="0">
+            <a:spAutoFit/>
+          </a:bodyPr>
+          <a:lstStyle/>
+          <a:p>
+            <a:r>
+              <a:rPr lang="en-US" b="1" i="1" dirty="0"/>
+              <a:t>4. Hygiene:</a:t>
+            </a:r>
+          </a:p>
+          <a:p>
+            <a:endParaRPr lang="en-US" dirty="0"/>
+          </a:p>
+          <a:p>
+            <a:r>
+              <a:rPr lang="en-US" dirty="0"/>
+              <a:t>Reduces the need to touch shared devices, promoting better hygiene, especially important in shared environments.</a:t>
+            </a:r>
+          </a:p>
+          <a:p>
+            <a:endParaRPr lang="en-US" dirty="0"/>
+          </a:p>
+          <a:p>
+            <a:r>
+              <a:rPr lang="en-US" b="1" i="1" dirty="0"/>
+              <a:t>5. Productivity:</a:t>
+            </a:r>
+          </a:p>
+          <a:p>
+            <a:endParaRPr lang="en-US" dirty="0"/>
+          </a:p>
+          <a:p>
+            <a:pPr marL="285750" indent="-285750">
+              <a:buFont typeface="Arial" panose="020B0604020202020204" pitchFamily="34" charset="0"/>
+              <a:buChar char="•"/>
+            </a:pPr>
+            <a:r>
+              <a:rPr lang="en-US" dirty="0"/>
+              <a:t>Allows for multitasking without the need for physical devices.</a:t>
+            </a:r>
+          </a:p>
+          <a:p>
+            <a:pPr marL="285750" indent="-285750">
+              <a:buFont typeface="Arial" panose="020B0604020202020204" pitchFamily="34" charset="0"/>
+              <a:buChar char="•"/>
+            </a:pPr>
+            <a:r>
+              <a:rPr lang="en-US" dirty="0"/>
+              <a:t>Can speed up certain tasks with quick gestures.</a:t>
+            </a:r>
+          </a:p>
+          <a:p>
+            <a:endParaRPr lang="en-US" dirty="0"/>
+          </a:p>
+          <a:p>
+            <a:r>
+              <a:rPr lang="en-US" b="1" i="1" dirty="0"/>
+              <a:t>6. Entertainment:</a:t>
+            </a:r>
+          </a:p>
+          <a:p>
+            <a:endParaRPr lang="en-US" dirty="0"/>
+          </a:p>
+          <a:p>
+            <a:pPr marL="285750" indent="-285750">
+              <a:buFont typeface="Arial" panose="020B0604020202020204" pitchFamily="34" charset="0"/>
+              <a:buChar char="•"/>
+            </a:pPr>
+            <a:r>
+              <a:rPr lang="en-US" dirty="0"/>
+              <a:t>Enhances the experience in gaming and multimedia applications.</a:t>
+            </a:r>
+          </a:p>
+          <a:p>
+            <a:pPr marL="285750" indent="-285750">
+              <a:buFont typeface="Arial" panose="020B0604020202020204" pitchFamily="34" charset="0"/>
+              <a:buChar char="•"/>
+            </a:pPr>
+            <a:r>
+              <a:rPr lang="en-US" dirty="0"/>
+              <a:t>Provides a novel way to interact with virtual reality and augmented reality environments.</a:t>
+            </a:r>
+          </a:p>
+          <a:p>
+            <a:endParaRPr lang="en-US" dirty="0"/>
+          </a:p>
+          <a:p>
+            <a:r>
+              <a:rPr lang="en-US" b="1" i="1" dirty="0"/>
+              <a:t>7. Inclusivity:</a:t>
+            </a:r>
+          </a:p>
+          <a:p>
+            <a:endParaRPr lang="en-US" dirty="0"/>
+          </a:p>
+          <a:p>
+            <a:pPr marL="285750" indent="-285750">
+              <a:buFont typeface="Arial" panose="020B0604020202020204" pitchFamily="34" charset="0"/>
+              <a:buChar char="•"/>
+            </a:pPr>
+            <a:r>
+              <a:rPr lang="en-US" dirty="0"/>
+              <a:t>Makes technology more inclusive, allowing more people to use computers effectively.</a:t>
+            </a:r>
+          </a:p>
+          <a:p>
+            <a:pPr marL="285750" indent="-285750">
+              <a:buFont typeface="Arial" panose="020B0604020202020204" pitchFamily="34" charset="0"/>
+              <a:buChar char="•"/>
+            </a:pPr>
+            <a:r>
+              <a:rPr lang="en-US" dirty="0"/>
+              <a:t>Ensures that technology can be used by everyone, regardless of physical limitations.</a:t>
+            </a:r>
+            <a:endParaRPr lang="en-IN" dirty="0"/>
+          </a:p>
+        </p:txBody>
+      </p:sp>
     </p:spTree>
     <p:extLst>
       <p:ext uri="{BB962C8B-B14F-4D97-AF65-F5344CB8AC3E}">
-        <p14:creationId xmlns:p14="http://schemas.microsoft.com/office/powerpoint/2010/main" val="1671107041"/>
+        <p14:creationId xmlns:p14="http://schemas.microsoft.com/office/powerpoint/2010/main" val="4026022860"/>
       </p:ext>
     </p:extLst>
   </p:cSld>
@@ -8972,10 +9698,10 @@
       </p:grpSpPr>
       <p:sp>
         <p:nvSpPr>
-          <p:cNvPr id="3" name="Content Placeholder 2">
+          <p:cNvPr id="2" name="Title 1">
             <a:extLst>
               <a:ext uri="{FF2B5EF4-FFF2-40B4-BE49-F238E27FC236}">
-                <a16:creationId xmlns:a16="http://schemas.microsoft.com/office/drawing/2014/main" id="{305ADE99-58B4-94F2-3F82-CDAEBDC661A1}"/>
+                <a16:creationId xmlns:a16="http://schemas.microsoft.com/office/drawing/2014/main" id="{D2AF4656-21D5-F2C7-3C81-7923C2F2298A}"/>
               </a:ext>
             </a:extLst>
           </p:cNvPr>
@@ -8983,138 +9709,168 @@
             <a:spLocks noGrp="1"/>
           </p:cNvSpPr>
           <p:nvPr>
-            <p:ph idx="1"/>
+            <p:ph type="title"/>
           </p:nvPr>
         </p:nvSpPr>
         <p:spPr>
           <a:xfrm>
-            <a:off x="542873" y="922207"/>
-            <a:ext cx="9790829" cy="5439263"/>
+            <a:off x="587116" y="147918"/>
+            <a:ext cx="8409399" cy="1090947"/>
           </a:xfrm>
         </p:spPr>
         <p:txBody>
-          <a:bodyPr>
-            <a:normAutofit fontScale="92500" lnSpcReduction="10000"/>
-          </a:bodyPr>
+          <a:bodyPr/>
           <a:lstStyle/>
           <a:p>
             <a:r>
-              <a:rPr lang="en-IN" sz="2400" b="1" dirty="0">
+              <a:rPr lang="en-IN" sz="3600" b="1" u="sng" dirty="0">
                 <a:latin typeface="Times New Roman" panose="02020603050405020304" pitchFamily="18" charset="0"/>
                 <a:cs typeface="Times New Roman" panose="02020603050405020304" pitchFamily="18" charset="0"/>
               </a:rPr>
-              <a:t>OpenCV</a:t>
-            </a:r>
-            <a:r>
-              <a:rPr lang="en-IN" sz="2800" b="1" dirty="0">
-                <a:latin typeface="Times New Roman" panose="02020603050405020304" pitchFamily="18" charset="0"/>
-                <a:cs typeface="Times New Roman" panose="02020603050405020304" pitchFamily="18" charset="0"/>
-              </a:rPr>
-              <a:t>: </a:t>
-            </a:r>
-            <a:r>
-              <a:rPr lang="en-US" dirty="0">
-                <a:solidFill>
-                  <a:schemeClr val="tx1">
-                    <a:lumMod val="85000"/>
-                  </a:schemeClr>
-                </a:solidFill>
-                <a:latin typeface="Times New Roman" panose="02020603050405020304" pitchFamily="18" charset="0"/>
-                <a:cs typeface="Times New Roman" panose="02020603050405020304" pitchFamily="18" charset="0"/>
-              </a:rPr>
-              <a:t>OpenCV is an open source computer vision and machine learning software library. It contains over 2500 algorithms and is used for various applications such as face recognition, object detection, image processing, and more</a:t>
-            </a:r>
-            <a:r>
-              <a:rPr lang="en-IN" dirty="0">
-                <a:solidFill>
-                  <a:schemeClr val="tx1">
-                    <a:lumMod val="85000"/>
-                  </a:schemeClr>
-                </a:solidFill>
-                <a:latin typeface="Times New Roman" panose="02020603050405020304" pitchFamily="18" charset="0"/>
-                <a:cs typeface="Times New Roman" panose="02020603050405020304" pitchFamily="18" charset="0"/>
-              </a:rPr>
-              <a:t>. </a:t>
-            </a:r>
-            <a:r>
-              <a:rPr lang="en-US" dirty="0">
-                <a:solidFill>
-                  <a:schemeClr val="tx1">
-                    <a:lumMod val="85000"/>
-                  </a:schemeClr>
-                </a:solidFill>
-                <a:latin typeface="Times New Roman" panose="02020603050405020304" pitchFamily="18" charset="0"/>
-                <a:cs typeface="Times New Roman" panose="02020603050405020304" pitchFamily="18" charset="0"/>
-              </a:rPr>
-              <a:t>OpenCV was built to provide a common infrastructure for computer vision applications and to accelerate the use of machine perception in the commercial products.</a:t>
-            </a:r>
-            <a:endParaRPr lang="en-IN" dirty="0">
-              <a:solidFill>
-                <a:schemeClr val="tx1">
-                  <a:lumMod val="85000"/>
-                </a:schemeClr>
-              </a:solidFill>
-              <a:latin typeface="Times New Roman" panose="02020603050405020304" pitchFamily="18" charset="0"/>
-              <a:cs typeface="Times New Roman" panose="02020603050405020304" pitchFamily="18" charset="0"/>
-            </a:endParaRPr>
-          </a:p>
-          <a:p>
-            <a:r>
-              <a:rPr lang="en-IN" sz="2400" b="1" dirty="0">
-                <a:latin typeface="Times New Roman" panose="02020603050405020304" pitchFamily="18" charset="0"/>
-                <a:cs typeface="Times New Roman" panose="02020603050405020304" pitchFamily="18" charset="0"/>
-              </a:rPr>
-              <a:t>MediaPipe: </a:t>
-            </a:r>
-            <a:r>
-              <a:rPr lang="en-US" dirty="0">
-                <a:solidFill>
-                  <a:schemeClr val="tx1">
-                    <a:lumMod val="85000"/>
-                  </a:schemeClr>
-                </a:solidFill>
-                <a:latin typeface="Times New Roman" panose="02020603050405020304" pitchFamily="18" charset="0"/>
-                <a:cs typeface="Times New Roman" panose="02020603050405020304" pitchFamily="18" charset="0"/>
-              </a:rPr>
-              <a:t>MediaPipe is a cross-platform framework for building machine learning solutions for live and streaming media. It is an open source project developed by Google and it supports various applications such as face detection, hand tracking, object detection, and more. You can use MediaPipe to create custom pipelines for processing time-series data like video, audio, and images. MediaPipe also provides pre-trained models and tools for customizing and evaluating your solutions.</a:t>
-            </a:r>
-          </a:p>
-          <a:p>
-            <a:r>
-              <a:rPr lang="en-US" sz="2400" b="1" dirty="0">
-                <a:latin typeface="Times New Roman" panose="02020603050405020304" pitchFamily="18" charset="0"/>
-                <a:cs typeface="Times New Roman" panose="02020603050405020304" pitchFamily="18" charset="0"/>
-              </a:rPr>
-              <a:t>TensorFlow: </a:t>
-            </a:r>
-            <a:r>
-              <a:rPr lang="en-US" sz="2200" dirty="0">
-                <a:solidFill>
-                  <a:schemeClr val="tx1">
-                    <a:lumMod val="85000"/>
-                  </a:schemeClr>
-                </a:solidFill>
-                <a:latin typeface="Times New Roman" panose="02020603050405020304" pitchFamily="18" charset="0"/>
-                <a:cs typeface="Times New Roman" panose="02020603050405020304" pitchFamily="18" charset="0"/>
-              </a:rPr>
-              <a:t>TensorFlow is an open-source platform for creating machine learning and deep learning applications. It was developed by Google and released in 2015. TensorFlow allows you to build and train neural networks using data flow graphs, where nodes represent mathematical operations and edges represent tensors (multidimensional arrays) that flow between them. You can use TensorFlow to solve various problems such as image recognition, natural language processing, recommender systems, and more.</a:t>
-            </a:r>
-            <a:endParaRPr lang="en-IN" sz="2200" dirty="0">
-              <a:solidFill>
-                <a:schemeClr val="tx1">
-                  <a:lumMod val="85000"/>
-                </a:schemeClr>
-              </a:solidFill>
-              <a:latin typeface="Times New Roman" panose="02020603050405020304" pitchFamily="18" charset="0"/>
-              <a:cs typeface="Times New Roman" panose="02020603050405020304" pitchFamily="18" charset="0"/>
-            </a:endParaRPr>
+              <a:t>Major Technologies Used:</a:t>
+            </a:r>
+          </a:p>
+        </p:txBody>
+      </p:sp>
+      <p:sp>
+        <p:nvSpPr>
+          <p:cNvPr id="5" name="TextBox 4">
+            <a:extLst>
+              <a:ext uri="{FF2B5EF4-FFF2-40B4-BE49-F238E27FC236}">
+                <a16:creationId xmlns:a16="http://schemas.microsoft.com/office/drawing/2014/main" id="{035D76B3-794B-EC95-71A2-445BF1A49D47}"/>
+              </a:ext>
+            </a:extLst>
+          </p:cNvPr>
+          <p:cNvSpPr txBox="1"/>
+          <p:nvPr/>
+        </p:nvSpPr>
+        <p:spPr>
+          <a:xfrm>
+            <a:off x="587116" y="953730"/>
+            <a:ext cx="10080884" cy="5632311"/>
+          </a:xfrm>
+          <a:prstGeom prst="rect">
+            <a:avLst/>
+          </a:prstGeom>
+          <a:noFill/>
+        </p:spPr>
+        <p:txBody>
+          <a:bodyPr wrap="square" rtlCol="0">
+            <a:spAutoFit/>
+          </a:bodyPr>
+          <a:lstStyle/>
+          <a:p>
+            <a:pPr marL="342900" indent="-342900">
+              <a:buAutoNum type="arabicPeriod"/>
+            </a:pPr>
+            <a:r>
+              <a:rPr lang="en-US" b="1" i="1" dirty="0"/>
+              <a:t>OpenCV (Open Source Computer Vision Library) </a:t>
+            </a:r>
+            <a:r>
+              <a:rPr lang="en-US" dirty="0"/>
+              <a:t>is an open-source computer vision and machine learning software library. It provides a wide range of functionalities for image and video processing, including object detection, facial recognition, and gesture tracking.</a:t>
+            </a:r>
+          </a:p>
+          <a:p>
+            <a:endParaRPr lang="en-US" dirty="0"/>
+          </a:p>
+          <a:p>
+            <a:r>
+              <a:rPr lang="en-US" b="1" i="1" dirty="0"/>
+              <a:t>Usage in the Project:</a:t>
+            </a:r>
+          </a:p>
+          <a:p>
+            <a:endParaRPr lang="en-US" b="1" i="1" dirty="0"/>
+          </a:p>
+          <a:p>
+            <a:pPr marL="285750" indent="-285750">
+              <a:buFont typeface="Arial" panose="020B0604020202020204" pitchFamily="34" charset="0"/>
+              <a:buChar char="•"/>
+            </a:pPr>
+            <a:r>
+              <a:rPr lang="en-US" b="1" dirty="0"/>
+              <a:t>Webcam Access</a:t>
+            </a:r>
+            <a:r>
+              <a:rPr lang="en-US" dirty="0"/>
+              <a:t>: OpenCV is used to access the webcam and capture live video frames. The </a:t>
+            </a:r>
+            <a:r>
+              <a:rPr lang="en-US" i="1" dirty="0"/>
+              <a:t>cv2.VideoCapture() </a:t>
+            </a:r>
+            <a:r>
+              <a:rPr lang="en-US" dirty="0"/>
+              <a:t>function establishes a connection to the webcam, allowing the system to receive a continuous stream of video frames.</a:t>
+            </a:r>
+          </a:p>
+          <a:p>
+            <a:pPr marL="285750" indent="-285750">
+              <a:buFont typeface="Arial" panose="020B0604020202020204" pitchFamily="34" charset="0"/>
+              <a:buChar char="•"/>
+            </a:pPr>
+            <a:endParaRPr lang="en-US" dirty="0"/>
+          </a:p>
+          <a:p>
+            <a:pPr marL="285750" indent="-285750">
+              <a:buFont typeface="Arial" panose="020B0604020202020204" pitchFamily="34" charset="0"/>
+              <a:buChar char="•"/>
+            </a:pPr>
+            <a:r>
+              <a:rPr lang="en-US" b="1" dirty="0"/>
+              <a:t>Image Processing</a:t>
+            </a:r>
+            <a:r>
+              <a:rPr lang="en-US" dirty="0"/>
+              <a:t>: OpenCV provides functionalities for image processing, such as color space conversion (cv2.cvtColor()), drawing shapes on images (cv2.circle(), cv2.rectangle()), and displaying images (cv2.imshow(), cv2.waitKey()). These are utilized for visualizing the hand tracking results and interacting with the user.</a:t>
+            </a:r>
+          </a:p>
+          <a:p>
+            <a:pPr marL="285750" indent="-285750">
+              <a:buFont typeface="Arial" panose="020B0604020202020204" pitchFamily="34" charset="0"/>
+              <a:buChar char="•"/>
+            </a:pPr>
+            <a:endParaRPr lang="en-US" dirty="0"/>
+          </a:p>
+          <a:p>
+            <a:pPr marL="285750" indent="-285750">
+              <a:buFont typeface="Arial" panose="020B0604020202020204" pitchFamily="34" charset="0"/>
+              <a:buChar char="•"/>
+            </a:pPr>
+            <a:r>
+              <a:rPr lang="en-US" b="1" dirty="0"/>
+              <a:t>Hand Tracking</a:t>
+            </a:r>
+            <a:r>
+              <a:rPr lang="en-US" dirty="0"/>
+              <a:t>: Although </a:t>
+            </a:r>
+            <a:r>
+              <a:rPr lang="en-US" dirty="0" err="1"/>
+              <a:t>MediaPipe</a:t>
+            </a:r>
+            <a:r>
+              <a:rPr lang="en-US" dirty="0"/>
+              <a:t> is primarily used for hand tracking, OpenCV still plays a role in processing the video frames before passing them to </a:t>
+            </a:r>
+            <a:r>
+              <a:rPr lang="en-US" dirty="0" err="1"/>
+              <a:t>MediaPipe</a:t>
+            </a:r>
+            <a:r>
+              <a:rPr lang="en-US" dirty="0"/>
+              <a:t>. OpenCV's image processing capabilities can be used to enhance the quality of input frames, adjust brightness and contrast, or apply filters if needed.</a:t>
+            </a:r>
+            <a:endParaRPr lang="en-IN" dirty="0"/>
           </a:p>
         </p:txBody>
       </p:sp>
     </p:spTree>
     <p:extLst>
       <p:ext uri="{BB962C8B-B14F-4D97-AF65-F5344CB8AC3E}">
-        <p14:creationId xmlns:p14="http://schemas.microsoft.com/office/powerpoint/2010/main" val="2090647349"/>
+        <p14:creationId xmlns:p14="http://schemas.microsoft.com/office/powerpoint/2010/main" val="1671107041"/>
       </p:ext>
     </p:extLst>
   </p:cSld>
@@ -9155,74 +9911,173 @@
       </p:grpSpPr>
       <p:sp>
         <p:nvSpPr>
-          <p:cNvPr id="2" name="Title 1">
+          <p:cNvPr id="6" name="TextBox 5">
             <a:extLst>
               <a:ext uri="{FF2B5EF4-FFF2-40B4-BE49-F238E27FC236}">
-                <a16:creationId xmlns:a16="http://schemas.microsoft.com/office/drawing/2014/main" id="{593C655A-AAE2-1815-8B78-EACD5232E518}"/>
+                <a16:creationId xmlns:a16="http://schemas.microsoft.com/office/drawing/2014/main" id="{AD644AD3-3B96-82CA-2D8C-245FD35F9121}"/>
               </a:ext>
             </a:extLst>
           </p:cNvPr>
-          <p:cNvSpPr>
-            <a:spLocks noGrp="1"/>
-          </p:cNvSpPr>
-          <p:nvPr>
-            <p:ph type="title"/>
-          </p:nvPr>
+          <p:cNvSpPr txBox="1"/>
+          <p:nvPr/>
         </p:nvSpPr>
         <p:spPr>
           <a:xfrm>
-            <a:off x="646111" y="452718"/>
-            <a:ext cx="2716521" cy="923798"/>
+            <a:off x="589936" y="550608"/>
+            <a:ext cx="9340646" cy="5909310"/>
           </a:xfrm>
+          <a:prstGeom prst="rect">
+            <a:avLst/>
+          </a:prstGeom>
+          <a:noFill/>
         </p:spPr>
         <p:txBody>
-          <a:bodyPr/>
+          <a:bodyPr wrap="square" rtlCol="0">
+            <a:spAutoFit/>
+          </a:bodyPr>
           <a:lstStyle/>
           <a:p>
-            <a:r>
-              <a:rPr lang="en-IN" sz="4400" b="1" u="sng" dirty="0">
-                <a:latin typeface="Times New Roman" panose="02020603050405020304" pitchFamily="18" charset="0"/>
-                <a:cs typeface="Times New Roman" panose="02020603050405020304" pitchFamily="18" charset="0"/>
-              </a:rPr>
-              <a:t>Workflow</a:t>
+            <a:pPr marL="342900" indent="-342900">
+              <a:buAutoNum type="arabicPeriod" startAt="2"/>
+            </a:pPr>
+            <a:r>
+              <a:rPr lang="en-US" b="1" i="1" dirty="0" err="1"/>
+              <a:t>MediaPipe</a:t>
+            </a:r>
+            <a:r>
+              <a:rPr lang="en-US" b="1" i="1" dirty="0"/>
+              <a:t> </a:t>
+            </a:r>
+            <a:r>
+              <a:rPr lang="en-US" dirty="0"/>
+              <a:t>is an open-source framework developed by Google that offers</a:t>
+            </a:r>
+          </a:p>
+          <a:p>
+            <a:r>
+              <a:rPr lang="en-US" dirty="0"/>
+              <a:t>     customizable machine learning solutions for various multimedia tasks. It provides</a:t>
+            </a:r>
+          </a:p>
+          <a:p>
+            <a:r>
+              <a:rPr lang="en-US" dirty="0"/>
+              <a:t>     ready-to-use machine learning models and pipelines for tasks like object      </a:t>
+            </a:r>
+          </a:p>
+          <a:p>
+            <a:r>
+              <a:rPr lang="en-US" dirty="0"/>
+              <a:t>     detection, pose estimation, hand tracking, and facial recognition.</a:t>
+            </a:r>
+          </a:p>
+          <a:p>
+            <a:endParaRPr lang="en-US" dirty="0"/>
+          </a:p>
+          <a:p>
+            <a:r>
+              <a:rPr lang="en-US" b="1" i="1" dirty="0"/>
+              <a:t>Usage in the Project:</a:t>
+            </a:r>
+          </a:p>
+          <a:p>
+            <a:endParaRPr lang="en-US" b="1" i="1" dirty="0"/>
+          </a:p>
+          <a:p>
+            <a:pPr marL="285750" indent="-285750">
+              <a:buFont typeface="Arial" panose="020B0604020202020204" pitchFamily="34" charset="0"/>
+              <a:buChar char="•"/>
+            </a:pPr>
+            <a:r>
+              <a:rPr lang="en-US" b="1" dirty="0"/>
+              <a:t>Hand Tracking Model</a:t>
+            </a:r>
+            <a:r>
+              <a:rPr lang="en-US" dirty="0"/>
+              <a:t>: </a:t>
+            </a:r>
+            <a:r>
+              <a:rPr lang="en-US" dirty="0" err="1"/>
+              <a:t>MediaPipe</a:t>
+            </a:r>
+            <a:r>
+              <a:rPr lang="en-US" dirty="0"/>
+              <a:t> provides a pre-trained machine learning model for hand tracking, specifically the </a:t>
+            </a:r>
+            <a:r>
+              <a:rPr lang="en-US" dirty="0" err="1"/>
+              <a:t>mp.solutions.hands</a:t>
+            </a:r>
+            <a:r>
+              <a:rPr lang="en-US" dirty="0"/>
+              <a:t> module. This model is capable of detecting and tracking the landmarks (key points) of the hand in real-time.</a:t>
+            </a:r>
+          </a:p>
+          <a:p>
+            <a:pPr marL="285750" indent="-285750">
+              <a:buFont typeface="Arial" panose="020B0604020202020204" pitchFamily="34" charset="0"/>
+              <a:buChar char="•"/>
+            </a:pPr>
+            <a:endParaRPr lang="en-US" dirty="0"/>
+          </a:p>
+          <a:p>
+            <a:pPr marL="285750" indent="-285750">
+              <a:buFont typeface="Arial" panose="020B0604020202020204" pitchFamily="34" charset="0"/>
+              <a:buChar char="•"/>
+            </a:pPr>
+            <a:r>
+              <a:rPr lang="en-US" b="1" dirty="0"/>
+              <a:t>Landmark Detection</a:t>
+            </a:r>
+            <a:r>
+              <a:rPr lang="en-US" dirty="0"/>
+              <a:t>: </a:t>
+            </a:r>
+            <a:r>
+              <a:rPr lang="en-US" dirty="0" err="1"/>
+              <a:t>MediaPipe's</a:t>
+            </a:r>
+            <a:r>
+              <a:rPr lang="en-US" dirty="0"/>
+              <a:t> hand tracking model analyzes each video frame received from OpenCV and detects the positions of various landmarks on the hand, such as fingertips, knuckles, and palm. These landmarks are crucial for interpreting hand gestures accurately.</a:t>
+            </a:r>
+          </a:p>
+          <a:p>
+            <a:pPr marL="285750" indent="-285750">
+              <a:buFont typeface="Arial" panose="020B0604020202020204" pitchFamily="34" charset="0"/>
+              <a:buChar char="•"/>
+            </a:pPr>
+            <a:endParaRPr lang="en-US" dirty="0"/>
+          </a:p>
+          <a:p>
+            <a:pPr marL="285750" indent="-285750">
+              <a:buFont typeface="Arial" panose="020B0604020202020204" pitchFamily="34" charset="0"/>
+              <a:buChar char="•"/>
+            </a:pPr>
+            <a:r>
+              <a:rPr lang="en-US" b="1" dirty="0"/>
+              <a:t>Gesture Recognition</a:t>
+            </a:r>
+            <a:r>
+              <a:rPr lang="en-US" dirty="0"/>
+              <a:t>: Based on the detected landmarks, </a:t>
+            </a:r>
+            <a:r>
+              <a:rPr lang="en-US" dirty="0" err="1"/>
+              <a:t>MediaPipe's</a:t>
+            </a:r>
+            <a:r>
+              <a:rPr lang="en-US" dirty="0"/>
+              <a:t> hand tracking model can recognize various hand gestures. These gestures are then mapped to specific actions, such as moving the cursor, clicking, scrolling, or controlling a presentation.</a:t>
             </a:r>
             <a:endParaRPr lang="en-IN" dirty="0"/>
           </a:p>
         </p:txBody>
       </p:sp>
-      <p:pic>
-        <p:nvPicPr>
-          <p:cNvPr id="5" name="Content Placeholder 4">
-            <a:extLst>
-              <a:ext uri="{FF2B5EF4-FFF2-40B4-BE49-F238E27FC236}">
-                <a16:creationId xmlns:a16="http://schemas.microsoft.com/office/drawing/2014/main" id="{EA2F53AA-BFAC-1EAE-3A87-72EE3A22EC21}"/>
-              </a:ext>
-            </a:extLst>
-          </p:cNvPr>
-          <p:cNvPicPr>
-            <a:picLocks noGrp="1" noChangeAspect="1"/>
-          </p:cNvPicPr>
-          <p:nvPr>
-            <p:ph idx="1"/>
-          </p:nvPr>
-        </p:nvPicPr>
-        <p:blipFill>
-          <a:blip r:embed="rId2"/>
-          <a:stretch>
-            <a:fillRect/>
-          </a:stretch>
-        </p:blipFill>
-        <p:spPr>
-          <a:xfrm>
-            <a:off x="2074606" y="1376516"/>
-            <a:ext cx="6902246" cy="5155120"/>
-          </a:xfrm>
-        </p:spPr>
-      </p:pic>
     </p:spTree>
     <p:extLst>
       <p:ext uri="{BB962C8B-B14F-4D97-AF65-F5344CB8AC3E}">
-        <p14:creationId xmlns:p14="http://schemas.microsoft.com/office/powerpoint/2010/main" val="2570237912"/>
+        <p14:creationId xmlns:p14="http://schemas.microsoft.com/office/powerpoint/2010/main" val="2090647349"/>
       </p:ext>
     </p:extLst>
   </p:cSld>
@@ -9261,136 +10116,152 @@
           <a:chExt cx="0" cy="0"/>
         </a:xfrm>
       </p:grpSpPr>
-      <p:sp>
-        <p:nvSpPr>
-          <p:cNvPr id="2" name="Title 1">
+      <p:pic>
+        <p:nvPicPr>
+          <p:cNvPr id="7" name="Picture 6">
             <a:extLst>
               <a:ext uri="{FF2B5EF4-FFF2-40B4-BE49-F238E27FC236}">
-                <a16:creationId xmlns:a16="http://schemas.microsoft.com/office/drawing/2014/main" id="{2A513F2D-7C0B-5ECE-73AA-B4BF394148B3}"/>
+                <a16:creationId xmlns:a16="http://schemas.microsoft.com/office/drawing/2014/main" id="{475EE997-92EB-5436-27B5-B1AC45429CE1}"/>
               </a:ext>
             </a:extLst>
           </p:cNvPr>
-          <p:cNvSpPr>
-            <a:spLocks noGrp="1"/>
-          </p:cNvSpPr>
-          <p:nvPr>
-            <p:ph type="title"/>
-          </p:nvPr>
-        </p:nvSpPr>
+          <p:cNvPicPr>
+            <a:picLocks noChangeAspect="1"/>
+          </p:cNvPicPr>
+          <p:nvPr/>
+        </p:nvPicPr>
+        <p:blipFill>
+          <a:blip r:embed="rId2"/>
+          <a:stretch>
+            <a:fillRect/>
+          </a:stretch>
+        </p:blipFill>
         <p:spPr>
           <a:xfrm>
-            <a:off x="646112" y="452719"/>
-            <a:ext cx="5892340" cy="776314"/>
+            <a:off x="2544346" y="3627120"/>
+            <a:ext cx="5979894" cy="2237043"/>
           </a:xfrm>
+          <a:prstGeom prst="rect">
+            <a:avLst/>
+          </a:prstGeom>
         </p:spPr>
-        <p:txBody>
-          <a:bodyPr/>
-          <a:lstStyle/>
-          <a:p>
-            <a:r>
-              <a:rPr lang="en-IN" sz="4000" b="1" u="sng" dirty="0">
-                <a:latin typeface="Times New Roman" panose="02020603050405020304" pitchFamily="18" charset="0"/>
-                <a:cs typeface="Times New Roman" panose="02020603050405020304" pitchFamily="18" charset="0"/>
-              </a:rPr>
-              <a:t>Classification Algorithm</a:t>
-            </a:r>
-            <a:endParaRPr lang="en-IN" dirty="0"/>
-          </a:p>
-        </p:txBody>
-      </p:sp>
-      <p:sp>
-        <p:nvSpPr>
-          <p:cNvPr id="3" name="Content Placeholder 2">
+      </p:pic>
+      <p:pic>
+        <p:nvPicPr>
+          <p:cNvPr id="9" name="Picture 8">
             <a:extLst>
               <a:ext uri="{FF2B5EF4-FFF2-40B4-BE49-F238E27FC236}">
-                <a16:creationId xmlns:a16="http://schemas.microsoft.com/office/drawing/2014/main" id="{2F5F70C1-E38A-CAF4-5A32-3BA872FE0CAF}"/>
+                <a16:creationId xmlns:a16="http://schemas.microsoft.com/office/drawing/2014/main" id="{6A3F6CA3-1F0C-F9B7-6393-5138A69DB9BB}"/>
               </a:ext>
             </a:extLst>
           </p:cNvPr>
-          <p:cNvSpPr>
-            <a:spLocks noGrp="1"/>
-          </p:cNvSpPr>
-          <p:nvPr>
-            <p:ph idx="1"/>
-          </p:nvPr>
-        </p:nvSpPr>
+          <p:cNvPicPr>
+            <a:picLocks noChangeAspect="1"/>
+          </p:cNvPicPr>
+          <p:nvPr/>
+        </p:nvPicPr>
+        <p:blipFill>
+          <a:blip r:embed="rId3"/>
+          <a:stretch>
+            <a:fillRect/>
+          </a:stretch>
+        </p:blipFill>
         <p:spPr>
           <a:xfrm>
-            <a:off x="646112" y="1366684"/>
-            <a:ext cx="9214111" cy="4803057"/>
+            <a:off x="2957934" y="356738"/>
+            <a:ext cx="4916066" cy="2481012"/>
           </a:xfrm>
+          <a:prstGeom prst="rect">
+            <a:avLst/>
+          </a:prstGeom>
         </p:spPr>
-        <p:txBody>
-          <a:bodyPr/>
+      </p:pic>
+      <p:sp>
+        <p:nvSpPr>
+          <p:cNvPr id="10" name="Arrow: Down 9">
+            <a:extLst>
+              <a:ext uri="{FF2B5EF4-FFF2-40B4-BE49-F238E27FC236}">
+                <a16:creationId xmlns:a16="http://schemas.microsoft.com/office/drawing/2014/main" id="{D6EA2CAC-A8D4-7CE7-9CB8-0A9774C4B1A3}"/>
+              </a:ext>
+            </a:extLst>
+          </p:cNvPr>
+          <p:cNvSpPr/>
+          <p:nvPr/>
+        </p:nvSpPr>
+        <p:spPr>
+          <a:xfrm>
+            <a:off x="5126407" y="2956560"/>
+            <a:ext cx="579120" cy="609600"/>
+          </a:xfrm>
+          <a:prstGeom prst="downArrow">
+            <a:avLst/>
+          </a:prstGeom>
+        </p:spPr>
+        <p:style>
+          <a:lnRef idx="2">
+            <a:schemeClr val="accent1">
+              <a:shade val="15000"/>
+            </a:schemeClr>
+          </a:lnRef>
+          <a:fillRef idx="1">
+            <a:schemeClr val="accent1"/>
+          </a:fillRef>
+          <a:effectRef idx="0">
+            <a:schemeClr val="accent1"/>
+          </a:effectRef>
+          <a:fontRef idx="minor">
+            <a:schemeClr val="lt1"/>
+          </a:fontRef>
+        </p:style>
+        <p:txBody>
+          <a:bodyPr rtlCol="0" anchor="ctr"/>
           <a:lstStyle/>
           <a:p>
-            <a:r>
-              <a:rPr lang="en-IN" sz="2200" b="1" dirty="0">
-                <a:latin typeface="Times New Roman" panose="02020603050405020304" pitchFamily="18" charset="0"/>
-                <a:cs typeface="Times New Roman" panose="02020603050405020304" pitchFamily="18" charset="0"/>
-              </a:rPr>
-              <a:t>CNN</a:t>
-            </a:r>
+            <a:pPr algn="ctr"/>
+            <a:endParaRPr lang="en-IN" dirty="0"/>
+          </a:p>
+        </p:txBody>
+      </p:sp>
+      <p:sp>
+        <p:nvSpPr>
+          <p:cNvPr id="12" name="TextBox 11">
+            <a:extLst>
+              <a:ext uri="{FF2B5EF4-FFF2-40B4-BE49-F238E27FC236}">
+                <a16:creationId xmlns:a16="http://schemas.microsoft.com/office/drawing/2014/main" id="{09C3E2CB-DAFF-3B7C-6A24-495E38193B71}"/>
+              </a:ext>
+            </a:extLst>
+          </p:cNvPr>
+          <p:cNvSpPr txBox="1"/>
+          <p:nvPr/>
+        </p:nvSpPr>
+        <p:spPr>
+          <a:xfrm>
+            <a:off x="2534186" y="6075680"/>
+            <a:ext cx="5878294" cy="369332"/>
+          </a:xfrm>
+          <a:prstGeom prst="rect">
+            <a:avLst/>
+          </a:prstGeom>
+          <a:noFill/>
+        </p:spPr>
+        <p:txBody>
+          <a:bodyPr wrap="square" rtlCol="0">
+            <a:spAutoFit/>
+          </a:bodyPr>
+          <a:lstStyle/>
+          <a:p>
+            <a:pPr algn="ctr"/>
             <a:r>
               <a:rPr lang="en-IN" b="1" dirty="0"/>
-              <a:t>: </a:t>
-            </a:r>
-            <a:r>
-              <a:rPr lang="en-US" dirty="0">
-                <a:solidFill>
-                  <a:schemeClr val="tx1">
-                    <a:lumMod val="85000"/>
-                  </a:schemeClr>
-                </a:solidFill>
-                <a:latin typeface="Times New Roman" panose="02020603050405020304" pitchFamily="18" charset="0"/>
-                <a:cs typeface="Times New Roman" panose="02020603050405020304" pitchFamily="18" charset="0"/>
-              </a:rPr>
-              <a:t>CNN stands for Convolutional Neural Network, which is a type of deep learning algorithm that is particularly well-suited for image recognition and processing tasks. It is made up of multiple layers, including convolutional layers, pooling layers, and fully connected layers. The convolutional layers are the key component of a CNN, where filters are applied to the input image to extract features such as edges, textures, and shapes. The output of the convolutional layers is then passed through pooling layers, which are used to down-sample the feature maps, reducing the spatial dimensions while retaining the most important information.</a:t>
-            </a:r>
-          </a:p>
-          <a:p>
-            <a:r>
-              <a:rPr lang="en-US" sz="2200" b="1" dirty="0">
-                <a:latin typeface="Times New Roman" panose="02020603050405020304" pitchFamily="18" charset="0"/>
-                <a:cs typeface="Times New Roman" panose="02020603050405020304" pitchFamily="18" charset="0"/>
-              </a:rPr>
-              <a:t>LSTM</a:t>
-            </a:r>
-            <a:r>
-              <a:rPr lang="en-US" b="1" dirty="0">
-                <a:latin typeface="Times New Roman" panose="02020603050405020304" pitchFamily="18" charset="0"/>
-                <a:cs typeface="Times New Roman" panose="02020603050405020304" pitchFamily="18" charset="0"/>
-              </a:rPr>
-              <a:t>: </a:t>
-            </a:r>
-            <a:r>
-              <a:rPr lang="en-US" dirty="0">
-                <a:solidFill>
-                  <a:schemeClr val="tx1">
-                    <a:lumMod val="85000"/>
-                  </a:schemeClr>
-                </a:solidFill>
-                <a:latin typeface="Times New Roman" panose="02020603050405020304" pitchFamily="18" charset="0"/>
-                <a:cs typeface="Times New Roman" panose="02020603050405020304" pitchFamily="18" charset="0"/>
-              </a:rPr>
-              <a:t>An LSTM model is a type of recurrent neural network (RNN) that can process sequential data, such as text, speech, or time series. LSTM stands for Long Short-Term Memory, which refers to the memory cells and gates that are used to control the flow of information inside the network. LSTM models are able to learn long-term dependencies and avoid the vanishing gradient problem that affects standard RNNs</a:t>
-            </a:r>
-            <a:endParaRPr lang="en-IN" dirty="0">
-              <a:solidFill>
-                <a:schemeClr val="tx1">
-                  <a:lumMod val="85000"/>
-                </a:schemeClr>
-              </a:solidFill>
-              <a:latin typeface="Times New Roman" panose="02020603050405020304" pitchFamily="18" charset="0"/>
-              <a:cs typeface="Times New Roman" panose="02020603050405020304" pitchFamily="18" charset="0"/>
-            </a:endParaRPr>
+              <a:t>Fig: Detection and Conversion to Hand Landmarks</a:t>
+            </a:r>
           </a:p>
         </p:txBody>
       </p:sp>
     </p:spTree>
     <p:extLst>
       <p:ext uri="{BB962C8B-B14F-4D97-AF65-F5344CB8AC3E}">
-        <p14:creationId xmlns:p14="http://schemas.microsoft.com/office/powerpoint/2010/main" val="3298281859"/>
+        <p14:creationId xmlns:p14="http://schemas.microsoft.com/office/powerpoint/2010/main" val="2570237912"/>
       </p:ext>
     </p:extLst>
   </p:cSld>

</xml_diff>